<commit_message>
Updated slides on calibration
</commit_message>
<xml_diff>
--- a/Slides/Calibración.pptx
+++ b/Slides/Calibración.pptx
@@ -5,7 +5,7 @@
     <p:sldMasterId id="2147483648" r:id="rId1"/>
   </p:sldMasterIdLst>
   <p:notesMasterIdLst>
-    <p:notesMasterId r:id="rId30"/>
+    <p:notesMasterId r:id="rId32"/>
   </p:notesMasterIdLst>
   <p:sldIdLst>
     <p:sldId id="256" r:id="rId2"/>
@@ -13,29 +13,31 @@
     <p:sldId id="258" r:id="rId4"/>
     <p:sldId id="259" r:id="rId5"/>
     <p:sldId id="260" r:id="rId6"/>
-    <p:sldId id="261" r:id="rId7"/>
-    <p:sldId id="262" r:id="rId8"/>
-    <p:sldId id="263" r:id="rId9"/>
-    <p:sldId id="264" r:id="rId10"/>
-    <p:sldId id="265" r:id="rId11"/>
-    <p:sldId id="266" r:id="rId12"/>
-    <p:sldId id="267" r:id="rId13"/>
-    <p:sldId id="268" r:id="rId14"/>
-    <p:sldId id="269" r:id="rId15"/>
-    <p:sldId id="270" r:id="rId16"/>
-    <p:sldId id="271" r:id="rId17"/>
-    <p:sldId id="272" r:id="rId18"/>
-    <p:sldId id="273" r:id="rId19"/>
-    <p:sldId id="274" r:id="rId20"/>
-    <p:sldId id="275" r:id="rId21"/>
-    <p:sldId id="276" r:id="rId22"/>
-    <p:sldId id="277" r:id="rId23"/>
-    <p:sldId id="278" r:id="rId24"/>
-    <p:sldId id="279" r:id="rId25"/>
-    <p:sldId id="280" r:id="rId26"/>
-    <p:sldId id="281" r:id="rId27"/>
-    <p:sldId id="282" r:id="rId28"/>
-    <p:sldId id="283" r:id="rId29"/>
+    <p:sldId id="285" r:id="rId7"/>
+    <p:sldId id="261" r:id="rId8"/>
+    <p:sldId id="262" r:id="rId9"/>
+    <p:sldId id="263" r:id="rId10"/>
+    <p:sldId id="264" r:id="rId11"/>
+    <p:sldId id="284" r:id="rId12"/>
+    <p:sldId id="265" r:id="rId13"/>
+    <p:sldId id="266" r:id="rId14"/>
+    <p:sldId id="267" r:id="rId15"/>
+    <p:sldId id="268" r:id="rId16"/>
+    <p:sldId id="269" r:id="rId17"/>
+    <p:sldId id="270" r:id="rId18"/>
+    <p:sldId id="271" r:id="rId19"/>
+    <p:sldId id="272" r:id="rId20"/>
+    <p:sldId id="273" r:id="rId21"/>
+    <p:sldId id="274" r:id="rId22"/>
+    <p:sldId id="275" r:id="rId23"/>
+    <p:sldId id="276" r:id="rId24"/>
+    <p:sldId id="277" r:id="rId25"/>
+    <p:sldId id="278" r:id="rId26"/>
+    <p:sldId id="279" r:id="rId27"/>
+    <p:sldId id="280" r:id="rId28"/>
+    <p:sldId id="281" r:id="rId29"/>
+    <p:sldId id="282" r:id="rId30"/>
+    <p:sldId id="283" r:id="rId31"/>
   </p:sldIdLst>
   <p:sldSz cx="12192000" cy="6858000"/>
   <p:notesSz cx="6858000" cy="9144000"/>
@@ -142,15 +144,158 @@
 </p:presentation>
 </file>
 
+<file path=ppt/revisionInfo.xml><?xml version="1.0" encoding="utf-8"?>
+<p1510:revInfo xmlns:a="http://schemas.openxmlformats.org/drawingml/2006/main" xmlns:r="http://schemas.openxmlformats.org/officeDocument/2006/relationships" xmlns:p1510="http://schemas.microsoft.com/office/powerpoint/2015/10/main">
+  <p1510:revLst>
+    <p1510:client id="{075C8478-BA38-1F43-B138-5D9104A1DC06}" v="2" dt="2025-05-14T15:29:27.898"/>
+    <p1510:client id="{955D99F0-B444-AF4E-B8BF-D9818DAF470D}" v="8" dt="2025-05-14T15:17:42.980"/>
+  </p1510:revLst>
+</p1510:revInfo>
+</file>
+
 <file path=ppt/changesInfos/changesInfo1.xml><?xml version="1.0" encoding="utf-8"?>
 <pc:chgInfo xmlns:a="http://schemas.openxmlformats.org/drawingml/2006/main" xmlns:r="http://schemas.openxmlformats.org/officeDocument/2006/relationships" xmlns:ac="http://schemas.microsoft.com/office/drawing/2013/main/command" xmlns:pc="http://schemas.microsoft.com/office/powerpoint/2013/main/command">
   <pc:docChgLst>
     <pc:chgData name="Carlos Rondón Moreno" userId="3eb52eec8da34d1e" providerId="LiveId" clId="{955D99F0-B444-AF4E-B8BF-D9818DAF470D}"/>
-    <pc:docChg chg="modSld">
-      <pc:chgData name="Carlos Rondón Moreno" userId="3eb52eec8da34d1e" providerId="LiveId" clId="{955D99F0-B444-AF4E-B8BF-D9818DAF470D}" dt="2025-05-14T13:57:12.074" v="2" actId="20577"/>
+    <pc:docChg chg="undo custSel addSld modSld">
+      <pc:chgData name="Carlos Rondón Moreno" userId="3eb52eec8da34d1e" providerId="LiveId" clId="{955D99F0-B444-AF4E-B8BF-D9818DAF470D}" dt="2025-05-14T15:17:46.856" v="64" actId="1076"/>
       <pc:docMkLst>
         <pc:docMk/>
       </pc:docMkLst>
+      <pc:sldChg chg="addSp delSp modSp mod setBg">
+        <pc:chgData name="Carlos Rondón Moreno" userId="3eb52eec8da34d1e" providerId="LiveId" clId="{955D99F0-B444-AF4E-B8BF-D9818DAF470D}" dt="2025-05-14T15:15:37.840" v="45" actId="1076"/>
+        <pc:sldMkLst>
+          <pc:docMk/>
+          <pc:sldMk cId="3204697612" sldId="264"/>
+        </pc:sldMkLst>
+        <pc:spChg chg="mod">
+          <ac:chgData name="Carlos Rondón Moreno" userId="3eb52eec8da34d1e" providerId="LiveId" clId="{955D99F0-B444-AF4E-B8BF-D9818DAF470D}" dt="2025-05-14T15:14:18.246" v="34" actId="20577"/>
+          <ac:spMkLst>
+            <pc:docMk/>
+            <pc:sldMk cId="3204697612" sldId="264"/>
+            <ac:spMk id="2" creationId="{318FBD01-9166-3E15-5310-9A14190C49A7}"/>
+          </ac:spMkLst>
+        </pc:spChg>
+        <pc:spChg chg="mod">
+          <ac:chgData name="Carlos Rondón Moreno" userId="3eb52eec8da34d1e" providerId="LiveId" clId="{955D99F0-B444-AF4E-B8BF-D9818DAF470D}" dt="2025-05-14T15:13:13.541" v="6" actId="26606"/>
+          <ac:spMkLst>
+            <pc:docMk/>
+            <pc:sldMk cId="3204697612" sldId="264"/>
+            <ac:spMk id="5" creationId="{B833A778-6A4B-04B5-E5B7-E4F564AC203C}"/>
+          </ac:spMkLst>
+        </pc:spChg>
+        <pc:spChg chg="add del mod">
+          <ac:chgData name="Carlos Rondón Moreno" userId="3eb52eec8da34d1e" providerId="LiveId" clId="{955D99F0-B444-AF4E-B8BF-D9818DAF470D}" dt="2025-05-14T15:13:03.962" v="4"/>
+          <ac:spMkLst>
+            <pc:docMk/>
+            <pc:sldMk cId="3204697612" sldId="264"/>
+            <ac:spMk id="6" creationId="{24DE3462-C0C3-225E-D01E-E82BB5FF308C}"/>
+          </ac:spMkLst>
+        </pc:spChg>
+        <pc:spChg chg="add mod">
+          <ac:chgData name="Carlos Rondón Moreno" userId="3eb52eec8da34d1e" providerId="LiveId" clId="{955D99F0-B444-AF4E-B8BF-D9818DAF470D}" dt="2025-05-14T15:14:20.565" v="35" actId="478"/>
+          <ac:spMkLst>
+            <pc:docMk/>
+            <pc:sldMk cId="3204697612" sldId="264"/>
+            <ac:spMk id="9" creationId="{4EFA702C-719E-772E-C708-BF8390E06495}"/>
+          </ac:spMkLst>
+        </pc:spChg>
+        <pc:spChg chg="add del">
+          <ac:chgData name="Carlos Rondón Moreno" userId="3eb52eec8da34d1e" providerId="LiveId" clId="{955D99F0-B444-AF4E-B8BF-D9818DAF470D}" dt="2025-05-14T15:13:13.541" v="6" actId="26606"/>
+          <ac:spMkLst>
+            <pc:docMk/>
+            <pc:sldMk cId="3204697612" sldId="264"/>
+            <ac:spMk id="12" creationId="{23D09407-53BC-485E-B4CE-BC5E4FC4B25B}"/>
+          </ac:spMkLst>
+        </pc:spChg>
+        <pc:spChg chg="add del">
+          <ac:chgData name="Carlos Rondón Moreno" userId="3eb52eec8da34d1e" providerId="LiveId" clId="{955D99F0-B444-AF4E-B8BF-D9818DAF470D}" dt="2025-05-14T15:13:13.541" v="6" actId="26606"/>
+          <ac:spMkLst>
+            <pc:docMk/>
+            <pc:sldMk cId="3204697612" sldId="264"/>
+            <ac:spMk id="14" creationId="{921DB988-49FC-4608-B0A2-E2F3A4019041}"/>
+          </ac:spMkLst>
+        </pc:spChg>
+        <pc:grpChg chg="add del">
+          <ac:chgData name="Carlos Rondón Moreno" userId="3eb52eec8da34d1e" providerId="LiveId" clId="{955D99F0-B444-AF4E-B8BF-D9818DAF470D}" dt="2025-05-14T15:13:13.541" v="6" actId="26606"/>
+          <ac:grpSpMkLst>
+            <pc:docMk/>
+            <pc:sldMk cId="3204697612" sldId="264"/>
+            <ac:grpSpMk id="16" creationId="{E9B930FD-8671-4C4C-ADCF-73AC1D0CD417}"/>
+          </ac:grpSpMkLst>
+        </pc:grpChg>
+        <pc:grpChg chg="add del">
+          <ac:chgData name="Carlos Rondón Moreno" userId="3eb52eec8da34d1e" providerId="LiveId" clId="{955D99F0-B444-AF4E-B8BF-D9818DAF470D}" dt="2025-05-14T15:13:13.541" v="6" actId="26606"/>
+          <ac:grpSpMkLst>
+            <pc:docMk/>
+            <pc:sldMk cId="3204697612" sldId="264"/>
+            <ac:grpSpMk id="22" creationId="{383C2651-AE0C-4AE4-8725-E2F9414FE219}"/>
+          </ac:grpSpMkLst>
+        </pc:grpChg>
+        <pc:picChg chg="del">
+          <ac:chgData name="Carlos Rondón Moreno" userId="3eb52eec8da34d1e" providerId="LiveId" clId="{955D99F0-B444-AF4E-B8BF-D9818DAF470D}" dt="2025-05-14T15:13:01.535" v="3" actId="478"/>
+          <ac:picMkLst>
+            <pc:docMk/>
+            <pc:sldMk cId="3204697612" sldId="264"/>
+            <ac:picMk id="4" creationId="{09714680-73F9-E451-80B3-C0B04F0913B6}"/>
+          </ac:picMkLst>
+        </pc:picChg>
+        <pc:picChg chg="add del mod">
+          <ac:chgData name="Carlos Rondón Moreno" userId="3eb52eec8da34d1e" providerId="LiveId" clId="{955D99F0-B444-AF4E-B8BF-D9818DAF470D}" dt="2025-05-14T15:14:20.565" v="35" actId="478"/>
+          <ac:picMkLst>
+            <pc:docMk/>
+            <pc:sldMk cId="3204697612" sldId="264"/>
+            <ac:picMk id="7" creationId="{6576EB2D-B02F-FB7F-BD8D-80648E343D61}"/>
+          </ac:picMkLst>
+        </pc:picChg>
+        <pc:picChg chg="add del mod">
+          <ac:chgData name="Carlos Rondón Moreno" userId="3eb52eec8da34d1e" providerId="LiveId" clId="{955D99F0-B444-AF4E-B8BF-D9818DAF470D}" dt="2025-05-14T15:15:27.008" v="39" actId="478"/>
+          <ac:picMkLst>
+            <pc:docMk/>
+            <pc:sldMk cId="3204697612" sldId="264"/>
+            <ac:picMk id="10" creationId="{565FCF70-8323-1D54-0F06-7151AC71B0FF}"/>
+          </ac:picMkLst>
+        </pc:picChg>
+        <pc:picChg chg="add mod">
+          <ac:chgData name="Carlos Rondón Moreno" userId="3eb52eec8da34d1e" providerId="LiveId" clId="{955D99F0-B444-AF4E-B8BF-D9818DAF470D}" dt="2025-05-14T15:15:37.840" v="45" actId="1076"/>
+          <ac:picMkLst>
+            <pc:docMk/>
+            <pc:sldMk cId="3204697612" sldId="264"/>
+            <ac:picMk id="11" creationId="{CA7C6986-F4E2-1CDA-F480-B10FC6CFC195}"/>
+          </ac:picMkLst>
+        </pc:picChg>
+      </pc:sldChg>
+      <pc:sldChg chg="addSp delSp modSp mod">
+        <pc:chgData name="Carlos Rondón Moreno" userId="3eb52eec8da34d1e" providerId="LiveId" clId="{955D99F0-B444-AF4E-B8BF-D9818DAF470D}" dt="2025-05-14T15:16:57.279" v="58" actId="1076"/>
+        <pc:sldMkLst>
+          <pc:docMk/>
+          <pc:sldMk cId="980374933" sldId="275"/>
+        </pc:sldMkLst>
+        <pc:picChg chg="add del mod">
+          <ac:chgData name="Carlos Rondón Moreno" userId="3eb52eec8da34d1e" providerId="LiveId" clId="{955D99F0-B444-AF4E-B8BF-D9818DAF470D}" dt="2025-05-14T15:16:37.111" v="53" actId="478"/>
+          <ac:picMkLst>
+            <pc:docMk/>
+            <pc:sldMk cId="980374933" sldId="275"/>
+            <ac:picMk id="3" creationId="{2CF798C6-530E-97D9-5D23-D495AB357537}"/>
+          </ac:picMkLst>
+        </pc:picChg>
+        <pc:picChg chg="del">
+          <ac:chgData name="Carlos Rondón Moreno" userId="3eb52eec8da34d1e" providerId="LiveId" clId="{955D99F0-B444-AF4E-B8BF-D9818DAF470D}" dt="2025-05-14T15:16:27.026" v="46" actId="478"/>
+          <ac:picMkLst>
+            <pc:docMk/>
+            <pc:sldMk cId="980374933" sldId="275"/>
+            <ac:picMk id="4" creationId="{6D7396C3-E439-76AB-E5D7-B5DC83413848}"/>
+          </ac:picMkLst>
+        </pc:picChg>
+        <pc:picChg chg="add mod">
+          <ac:chgData name="Carlos Rondón Moreno" userId="3eb52eec8da34d1e" providerId="LiveId" clId="{955D99F0-B444-AF4E-B8BF-D9818DAF470D}" dt="2025-05-14T15:16:57.279" v="58" actId="1076"/>
+          <ac:picMkLst>
+            <pc:docMk/>
+            <pc:sldMk cId="980374933" sldId="275"/>
+            <ac:picMk id="5" creationId="{C831FBC9-581F-3C5E-363C-9829D2096845}"/>
+          </ac:picMkLst>
+        </pc:picChg>
+      </pc:sldChg>
       <pc:sldChg chg="modSp mod">
         <pc:chgData name="Carlos Rondón Moreno" userId="3eb52eec8da34d1e" providerId="LiveId" clId="{955D99F0-B444-AF4E-B8BF-D9818DAF470D}" dt="2025-05-14T13:57:12.074" v="2" actId="20577"/>
         <pc:sldMkLst>
@@ -165,6 +310,140 @@
             <ac:spMk id="3" creationId="{B31CCAD7-484C-B02A-BDD5-18CEB793D9BF}"/>
           </ac:spMkLst>
         </pc:spChg>
+      </pc:sldChg>
+      <pc:sldChg chg="addSp delSp modSp mod setBg">
+        <pc:chgData name="Carlos Rondón Moreno" userId="3eb52eec8da34d1e" providerId="LiveId" clId="{955D99F0-B444-AF4E-B8BF-D9818DAF470D}" dt="2025-05-14T15:17:46.856" v="64" actId="1076"/>
+        <pc:sldMkLst>
+          <pc:docMk/>
+          <pc:sldMk cId="311335858" sldId="283"/>
+        </pc:sldMkLst>
+        <pc:spChg chg="mod">
+          <ac:chgData name="Carlos Rondón Moreno" userId="3eb52eec8da34d1e" providerId="LiveId" clId="{955D99F0-B444-AF4E-B8BF-D9818DAF470D}" dt="2025-05-14T15:17:42.217" v="61" actId="26606"/>
+          <ac:spMkLst>
+            <pc:docMk/>
+            <pc:sldMk cId="311335858" sldId="283"/>
+            <ac:spMk id="2" creationId="{27DF6C3D-D6AD-07D7-2B4C-D2BDCB42701E}"/>
+          </ac:spMkLst>
+        </pc:spChg>
+        <pc:spChg chg="mod">
+          <ac:chgData name="Carlos Rondón Moreno" userId="3eb52eec8da34d1e" providerId="LiveId" clId="{955D99F0-B444-AF4E-B8BF-D9818DAF470D}" dt="2025-05-14T15:17:42.217" v="61" actId="26606"/>
+          <ac:spMkLst>
+            <pc:docMk/>
+            <pc:sldMk cId="311335858" sldId="283"/>
+            <ac:spMk id="3" creationId="{B5375422-F53B-B9F0-F011-843EB0777549}"/>
+          </ac:spMkLst>
+        </pc:spChg>
+        <pc:spChg chg="add del">
+          <ac:chgData name="Carlos Rondón Moreno" userId="3eb52eec8da34d1e" providerId="LiveId" clId="{955D99F0-B444-AF4E-B8BF-D9818DAF470D}" dt="2025-05-14T15:17:42.217" v="61" actId="26606"/>
+          <ac:spMkLst>
+            <pc:docMk/>
+            <pc:sldMk cId="311335858" sldId="283"/>
+            <ac:spMk id="8" creationId="{1A3C89F8-0D2F-47FF-B903-151248265F47}"/>
+          </ac:spMkLst>
+        </pc:spChg>
+        <pc:spChg chg="add del">
+          <ac:chgData name="Carlos Rondón Moreno" userId="3eb52eec8da34d1e" providerId="LiveId" clId="{955D99F0-B444-AF4E-B8BF-D9818DAF470D}" dt="2025-05-14T15:17:42.217" v="61" actId="26606"/>
+          <ac:spMkLst>
+            <pc:docMk/>
+            <pc:sldMk cId="311335858" sldId="283"/>
+            <ac:spMk id="10" creationId="{C5CB530E-515E-412C-9DF1-5F8FFBD6F383}"/>
+          </ac:spMkLst>
+        </pc:spChg>
+        <pc:spChg chg="add del">
+          <ac:chgData name="Carlos Rondón Moreno" userId="3eb52eec8da34d1e" providerId="LiveId" clId="{955D99F0-B444-AF4E-B8BF-D9818DAF470D}" dt="2025-05-14T15:17:42.217" v="61" actId="26606"/>
+          <ac:spMkLst>
+            <pc:docMk/>
+            <pc:sldMk cId="311335858" sldId="283"/>
+            <ac:spMk id="12" creationId="{712D4376-A578-4FF1-94FC-245E7A6A489F}"/>
+          </ac:spMkLst>
+        </pc:spChg>
+        <pc:spChg chg="add del">
+          <ac:chgData name="Carlos Rondón Moreno" userId="3eb52eec8da34d1e" providerId="LiveId" clId="{955D99F0-B444-AF4E-B8BF-D9818DAF470D}" dt="2025-05-14T15:17:42.217" v="61" actId="26606"/>
+          <ac:spMkLst>
+            <pc:docMk/>
+            <pc:sldMk cId="311335858" sldId="283"/>
+            <ac:spMk id="14" creationId="{AEA7509D-F04F-40CB-A0B3-EEF16499CC9F}"/>
+          </ac:spMkLst>
+        </pc:spChg>
+        <pc:spChg chg="add del">
+          <ac:chgData name="Carlos Rondón Moreno" userId="3eb52eec8da34d1e" providerId="LiveId" clId="{955D99F0-B444-AF4E-B8BF-D9818DAF470D}" dt="2025-05-14T15:17:42.217" v="61" actId="26606"/>
+          <ac:spMkLst>
+            <pc:docMk/>
+            <pc:sldMk cId="311335858" sldId="283"/>
+            <ac:spMk id="18" creationId="{508BEF50-7B1E-49A4-BC19-5F4F1D755E64}"/>
+          </ac:spMkLst>
+        </pc:spChg>
+        <pc:spChg chg="add del">
+          <ac:chgData name="Carlos Rondón Moreno" userId="3eb52eec8da34d1e" providerId="LiveId" clId="{955D99F0-B444-AF4E-B8BF-D9818DAF470D}" dt="2025-05-14T15:17:42.217" v="61" actId="26606"/>
+          <ac:spMkLst>
+            <pc:docMk/>
+            <pc:sldMk cId="311335858" sldId="283"/>
+            <ac:spMk id="20" creationId="{3FBAD350-5664-4811-A208-657FB882D350}"/>
+          </ac:spMkLst>
+        </pc:spChg>
+        <pc:spChg chg="add del">
+          <ac:chgData name="Carlos Rondón Moreno" userId="3eb52eec8da34d1e" providerId="LiveId" clId="{955D99F0-B444-AF4E-B8BF-D9818DAF470D}" dt="2025-05-14T15:17:42.217" v="61" actId="26606"/>
+          <ac:spMkLst>
+            <pc:docMk/>
+            <pc:sldMk cId="311335858" sldId="283"/>
+            <ac:spMk id="22" creationId="{C39ADB8F-D187-49D7-BDCF-C1B6DC727068}"/>
+          </ac:spMkLst>
+        </pc:spChg>
+        <pc:picChg chg="del">
+          <ac:chgData name="Carlos Rondón Moreno" userId="3eb52eec8da34d1e" providerId="LiveId" clId="{955D99F0-B444-AF4E-B8BF-D9818DAF470D}" dt="2025-05-14T15:17:23.103" v="59" actId="478"/>
+          <ac:picMkLst>
+            <pc:docMk/>
+            <pc:sldMk cId="311335858" sldId="283"/>
+            <ac:picMk id="4" creationId="{A45F7447-11F1-9B7E-535B-FE43084C0C08}"/>
+          </ac:picMkLst>
+        </pc:picChg>
+        <pc:picChg chg="add mod">
+          <ac:chgData name="Carlos Rondón Moreno" userId="3eb52eec8da34d1e" providerId="LiveId" clId="{955D99F0-B444-AF4E-B8BF-D9818DAF470D}" dt="2025-05-14T15:17:46.856" v="64" actId="1076"/>
+          <ac:picMkLst>
+            <pc:docMk/>
+            <pc:sldMk cId="311335858" sldId="283"/>
+            <ac:picMk id="5" creationId="{438E7B00-CEF9-E99A-47A0-542CDF142CE5}"/>
+          </ac:picMkLst>
+        </pc:picChg>
+        <pc:cxnChg chg="add del">
+          <ac:chgData name="Carlos Rondón Moreno" userId="3eb52eec8da34d1e" providerId="LiveId" clId="{955D99F0-B444-AF4E-B8BF-D9818DAF470D}" dt="2025-05-14T15:17:42.217" v="61" actId="26606"/>
+          <ac:cxnSpMkLst>
+            <pc:docMk/>
+            <pc:sldMk cId="311335858" sldId="283"/>
+            <ac:cxnSpMk id="16" creationId="{56020367-4FD5-4596-8E10-C5F095CD8DBF}"/>
+          </ac:cxnSpMkLst>
+        </pc:cxnChg>
+      </pc:sldChg>
+      <pc:sldChg chg="addSp delSp modSp add mod">
+        <pc:chgData name="Carlos Rondón Moreno" userId="3eb52eec8da34d1e" providerId="LiveId" clId="{955D99F0-B444-AF4E-B8BF-D9818DAF470D}" dt="2025-05-14T15:14:10.752" v="29" actId="1076"/>
+        <pc:sldMkLst>
+          <pc:docMk/>
+          <pc:sldMk cId="3435626507" sldId="284"/>
+        </pc:sldMkLst>
+        <pc:spChg chg="add del mod">
+          <ac:chgData name="Carlos Rondón Moreno" userId="3eb52eec8da34d1e" providerId="LiveId" clId="{955D99F0-B444-AF4E-B8BF-D9818DAF470D}" dt="2025-05-14T15:14:01.094" v="25"/>
+          <ac:spMkLst>
+            <pc:docMk/>
+            <pc:sldMk cId="3435626507" sldId="284"/>
+            <ac:spMk id="4" creationId="{77631EC2-B3FB-1140-D045-89B116A682D0}"/>
+          </ac:spMkLst>
+        </pc:spChg>
+        <pc:picChg chg="add mod">
+          <ac:chgData name="Carlos Rondón Moreno" userId="3eb52eec8da34d1e" providerId="LiveId" clId="{955D99F0-B444-AF4E-B8BF-D9818DAF470D}" dt="2025-05-14T15:14:10.752" v="29" actId="1076"/>
+          <ac:picMkLst>
+            <pc:docMk/>
+            <pc:sldMk cId="3435626507" sldId="284"/>
+            <ac:picMk id="6" creationId="{BF8E4FA7-FADD-DABE-09D0-2DEB0058190E}"/>
+          </ac:picMkLst>
+        </pc:picChg>
+        <pc:picChg chg="del">
+          <ac:chgData name="Carlos Rondón Moreno" userId="3eb52eec8da34d1e" providerId="LiveId" clId="{955D99F0-B444-AF4E-B8BF-D9818DAF470D}" dt="2025-05-14T15:13:58.985" v="24" actId="478"/>
+          <ac:picMkLst>
+            <pc:docMk/>
+            <pc:sldMk cId="3435626507" sldId="284"/>
+            <ac:picMk id="7" creationId="{F3FF567D-22D7-6305-D5F5-D141D492284F}"/>
+          </ac:picMkLst>
+        </pc:picChg>
       </pc:sldChg>
     </pc:docChg>
   </pc:docChgLst>
@@ -181,6 +460,62 @@
           <pc:docMk/>
           <pc:sldMk cId="591394009" sldId="271"/>
         </pc:sldMkLst>
+      </pc:sldChg>
+    </pc:docChg>
+  </pc:docChgLst>
+  <pc:docChgLst>
+    <pc:chgData name="Carlos Rondón Moreno" userId="3eb52eec8da34d1e" providerId="LiveId" clId="{075C8478-BA38-1F43-B138-5D9104A1DC06}"/>
+    <pc:docChg chg="custSel addSld modSld">
+      <pc:chgData name="Carlos Rondón Moreno" userId="3eb52eec8da34d1e" providerId="LiveId" clId="{075C8478-BA38-1F43-B138-5D9104A1DC06}" dt="2025-05-14T15:29:36.538" v="31" actId="20577"/>
+      <pc:docMkLst>
+        <pc:docMk/>
+      </pc:docMkLst>
+      <pc:sldChg chg="addSp delSp modSp new mod">
+        <pc:chgData name="Carlos Rondón Moreno" userId="3eb52eec8da34d1e" providerId="LiveId" clId="{075C8478-BA38-1F43-B138-5D9104A1DC06}" dt="2025-05-14T15:29:36.538" v="31" actId="20577"/>
+        <pc:sldMkLst>
+          <pc:docMk/>
+          <pc:sldMk cId="141498960" sldId="285"/>
+        </pc:sldMkLst>
+        <pc:spChg chg="mod">
+          <ac:chgData name="Carlos Rondón Moreno" userId="3eb52eec8da34d1e" providerId="LiveId" clId="{075C8478-BA38-1F43-B138-5D9104A1DC06}" dt="2025-05-14T15:29:36.538" v="31" actId="20577"/>
+          <ac:spMkLst>
+            <pc:docMk/>
+            <pc:sldMk cId="141498960" sldId="285"/>
+            <ac:spMk id="2" creationId="{1A8DA5ED-9F45-63FB-9A75-2B9C08FC4560}"/>
+          </ac:spMkLst>
+        </pc:spChg>
+        <pc:spChg chg="del">
+          <ac:chgData name="Carlos Rondón Moreno" userId="3eb52eec8da34d1e" providerId="LiveId" clId="{075C8478-BA38-1F43-B138-5D9104A1DC06}" dt="2025-05-14T15:28:25.917" v="1"/>
+          <ac:spMkLst>
+            <pc:docMk/>
+            <pc:sldMk cId="141498960" sldId="285"/>
+            <ac:spMk id="3" creationId="{8A742824-861C-E038-639E-FACDA4CE344C}"/>
+          </ac:spMkLst>
+        </pc:spChg>
+        <pc:spChg chg="add mod">
+          <ac:chgData name="Carlos Rondón Moreno" userId="3eb52eec8da34d1e" providerId="LiveId" clId="{075C8478-BA38-1F43-B138-5D9104A1DC06}" dt="2025-05-14T15:28:56.570" v="10" actId="478"/>
+          <ac:spMkLst>
+            <pc:docMk/>
+            <pc:sldMk cId="141498960" sldId="285"/>
+            <ac:spMk id="6" creationId="{982C3F73-F7A2-0280-4EC7-8F26C58F4543}"/>
+          </ac:spMkLst>
+        </pc:spChg>
+        <pc:picChg chg="add del mod">
+          <ac:chgData name="Carlos Rondón Moreno" userId="3eb52eec8da34d1e" providerId="LiveId" clId="{075C8478-BA38-1F43-B138-5D9104A1DC06}" dt="2025-05-14T15:28:56.570" v="10" actId="478"/>
+          <ac:picMkLst>
+            <pc:docMk/>
+            <pc:sldMk cId="141498960" sldId="285"/>
+            <ac:picMk id="4" creationId="{8D739E70-E3E6-8B7A-9C78-429DBB5D3E9C}"/>
+          </ac:picMkLst>
+        </pc:picChg>
+        <pc:picChg chg="add mod">
+          <ac:chgData name="Carlos Rondón Moreno" userId="3eb52eec8da34d1e" providerId="LiveId" clId="{075C8478-BA38-1F43-B138-5D9104A1DC06}" dt="2025-05-14T15:29:29.550" v="12" actId="1076"/>
+          <ac:picMkLst>
+            <pc:docMk/>
+            <pc:sldMk cId="141498960" sldId="285"/>
+            <ac:picMk id="7" creationId="{CCAE49E7-FC15-2D26-86D8-3353B75CEBA0}"/>
+          </ac:picMkLst>
+        </pc:picChg>
       </pc:sldChg>
     </pc:docChg>
   </pc:docChgLst>
@@ -3938,6 +4273,305 @@
 </file>
 
 <file path=ppt/slides/slide10.xml><?xml version="1.0" encoding="utf-8"?>
+<p:sld xmlns:a="http://schemas.openxmlformats.org/drawingml/2006/main" xmlns:r="http://schemas.openxmlformats.org/officeDocument/2006/relationships" xmlns:p="http://schemas.openxmlformats.org/presentationml/2006/main">
+  <p:cSld>
+    <p:spTree>
+      <p:nvGrpSpPr>
+        <p:cNvPr id="1" name=""/>
+        <p:cNvGrpSpPr/>
+        <p:nvPr/>
+      </p:nvGrpSpPr>
+      <p:grpSpPr>
+        <a:xfrm>
+          <a:off x="0" y="0"/>
+          <a:ext cx="0" cy="0"/>
+          <a:chOff x="0" y="0"/>
+          <a:chExt cx="0" cy="0"/>
+        </a:xfrm>
+      </p:grpSpPr>
+      <p:sp>
+        <p:nvSpPr>
+          <p:cNvPr id="2" name="Title 1">
+            <a:extLst>
+              <a:ext uri="{FF2B5EF4-FFF2-40B4-BE49-F238E27FC236}">
+                <a16:creationId xmlns:a16="http://schemas.microsoft.com/office/drawing/2014/main" id="{318FBD01-9166-3E15-5310-9A14190C49A7}"/>
+              </a:ext>
+            </a:extLst>
+          </p:cNvPr>
+          <p:cNvSpPr>
+            <a:spLocks noGrp="1"/>
+          </p:cNvSpPr>
+          <p:nvPr>
+            <p:ph type="title"/>
+          </p:nvPr>
+        </p:nvSpPr>
+        <p:spPr/>
+        <p:txBody>
+          <a:bodyPr/>
+          <a:lstStyle/>
+          <a:p>
+            <a:r>
+              <a:rPr lang="en-CL"/>
+              <a:t>Para EEUU (</a:t>
+            </a:r>
+            <a:r>
+              <a:rPr lang="es-419" dirty="0"/>
+              <a:t>Pre-1984</a:t>
+            </a:r>
+            <a:r>
+              <a:rPr lang="en-CL"/>
+              <a:t>)</a:t>
+            </a:r>
+            <a:endParaRPr lang="en-CL" dirty="0"/>
+          </a:p>
+        </p:txBody>
+      </p:sp>
+      <p:sp>
+        <p:nvSpPr>
+          <p:cNvPr id="5" name="TextBox 4">
+            <a:extLst>
+              <a:ext uri="{FF2B5EF4-FFF2-40B4-BE49-F238E27FC236}">
+                <a16:creationId xmlns:a16="http://schemas.microsoft.com/office/drawing/2014/main" id="{B833A778-6A4B-04B5-E5B7-E4F564AC203C}"/>
+              </a:ext>
+            </a:extLst>
+          </p:cNvPr>
+          <p:cNvSpPr txBox="1"/>
+          <p:nvPr/>
+        </p:nvSpPr>
+        <p:spPr>
+          <a:xfrm>
+            <a:off x="1025611" y="5942568"/>
+            <a:ext cx="1394228" cy="369332"/>
+          </a:xfrm>
+          <a:prstGeom prst="rect">
+            <a:avLst/>
+          </a:prstGeom>
+          <a:noFill/>
+        </p:spPr>
+        <p:txBody>
+          <a:bodyPr wrap="none" rtlCol="0">
+            <a:spAutoFit/>
+          </a:bodyPr>
+          <a:lstStyle/>
+          <a:p>
+            <a:r>
+              <a:rPr lang="en-CL"/>
+              <a:t>Fuente: BEA</a:t>
+            </a:r>
+            <a:endParaRPr lang="en-CL" dirty="0"/>
+          </a:p>
+        </p:txBody>
+      </p:sp>
+      <p:sp>
+        <p:nvSpPr>
+          <p:cNvPr id="9" name="Content Placeholder 8">
+            <a:extLst>
+              <a:ext uri="{FF2B5EF4-FFF2-40B4-BE49-F238E27FC236}">
+                <a16:creationId xmlns:a16="http://schemas.microsoft.com/office/drawing/2014/main" id="{4EFA702C-719E-772E-C708-BF8390E06495}"/>
+              </a:ext>
+            </a:extLst>
+          </p:cNvPr>
+          <p:cNvSpPr>
+            <a:spLocks noGrp="1"/>
+          </p:cNvSpPr>
+          <p:nvPr>
+            <p:ph idx="1"/>
+          </p:nvPr>
+        </p:nvSpPr>
+        <p:spPr/>
+        <p:txBody>
+          <a:bodyPr/>
+          <a:lstStyle/>
+          <a:p>
+            <a:endParaRPr lang="en-US" dirty="0"/>
+          </a:p>
+        </p:txBody>
+      </p:sp>
+      <p:pic>
+        <p:nvPicPr>
+          <p:cNvPr id="11" name="Picture 10">
+            <a:extLst>
+              <a:ext uri="{FF2B5EF4-FFF2-40B4-BE49-F238E27FC236}">
+                <a16:creationId xmlns:a16="http://schemas.microsoft.com/office/drawing/2014/main" id="{CA7C6986-F4E2-1CDA-F480-B10FC6CFC195}"/>
+              </a:ext>
+            </a:extLst>
+          </p:cNvPr>
+          <p:cNvPicPr>
+            <a:picLocks noChangeAspect="1"/>
+          </p:cNvPicPr>
+          <p:nvPr/>
+        </p:nvPicPr>
+        <p:blipFill>
+          <a:blip r:embed="rId2"/>
+          <a:stretch>
+            <a:fillRect/>
+          </a:stretch>
+        </p:blipFill>
+        <p:spPr>
+          <a:xfrm>
+            <a:off x="148057" y="1825625"/>
+            <a:ext cx="11895886" cy="3384741"/>
+          </a:xfrm>
+          <a:prstGeom prst="rect">
+            <a:avLst/>
+          </a:prstGeom>
+        </p:spPr>
+      </p:pic>
+    </p:spTree>
+    <p:extLst>
+      <p:ext uri="{BB962C8B-B14F-4D97-AF65-F5344CB8AC3E}">
+        <p14:creationId xmlns:p14="http://schemas.microsoft.com/office/powerpoint/2010/main" val="3204697612"/>
+      </p:ext>
+    </p:extLst>
+  </p:cSld>
+  <p:clrMapOvr>
+    <a:masterClrMapping/>
+  </p:clrMapOvr>
+</p:sld>
+</file>
+
+<file path=ppt/slides/slide11.xml><?xml version="1.0" encoding="utf-8"?>
+<p:sld xmlns:a="http://schemas.openxmlformats.org/drawingml/2006/main" xmlns:r="http://schemas.openxmlformats.org/officeDocument/2006/relationships" xmlns:p="http://schemas.openxmlformats.org/presentationml/2006/main">
+  <p:cSld>
+    <p:spTree>
+      <p:nvGrpSpPr>
+        <p:cNvPr id="1" name="">
+          <a:extLst>
+            <a:ext uri="{FF2B5EF4-FFF2-40B4-BE49-F238E27FC236}">
+              <a16:creationId xmlns:a16="http://schemas.microsoft.com/office/drawing/2014/main" id="{55B277CA-5ADF-C0CE-A867-E0162E755DD9}"/>
+            </a:ext>
+          </a:extLst>
+        </p:cNvPr>
+        <p:cNvGrpSpPr/>
+        <p:nvPr/>
+      </p:nvGrpSpPr>
+      <p:grpSpPr>
+        <a:xfrm>
+          <a:off x="0" y="0"/>
+          <a:ext cx="0" cy="0"/>
+          <a:chOff x="0" y="0"/>
+          <a:chExt cx="0" cy="0"/>
+        </a:xfrm>
+      </p:grpSpPr>
+      <p:sp>
+        <p:nvSpPr>
+          <p:cNvPr id="2" name="Title 1">
+            <a:extLst>
+              <a:ext uri="{FF2B5EF4-FFF2-40B4-BE49-F238E27FC236}">
+                <a16:creationId xmlns:a16="http://schemas.microsoft.com/office/drawing/2014/main" id="{E0FA9595-98D2-FEC6-313E-5620DA563231}"/>
+              </a:ext>
+            </a:extLst>
+          </p:cNvPr>
+          <p:cNvSpPr>
+            <a:spLocks noGrp="1"/>
+          </p:cNvSpPr>
+          <p:nvPr>
+            <p:ph type="title"/>
+          </p:nvPr>
+        </p:nvSpPr>
+        <p:spPr/>
+        <p:txBody>
+          <a:bodyPr/>
+          <a:lstStyle/>
+          <a:p>
+            <a:r>
+              <a:rPr lang="en-CL"/>
+              <a:t>Para EEUU (</a:t>
+            </a:r>
+            <a:r>
+              <a:rPr lang="es-419" dirty="0"/>
+              <a:t>Post-1984</a:t>
+            </a:r>
+            <a:r>
+              <a:rPr lang="en-CL"/>
+              <a:t>)</a:t>
+            </a:r>
+            <a:endParaRPr lang="en-CL" dirty="0"/>
+          </a:p>
+        </p:txBody>
+      </p:sp>
+      <p:sp>
+        <p:nvSpPr>
+          <p:cNvPr id="5" name="TextBox 4">
+            <a:extLst>
+              <a:ext uri="{FF2B5EF4-FFF2-40B4-BE49-F238E27FC236}">
+                <a16:creationId xmlns:a16="http://schemas.microsoft.com/office/drawing/2014/main" id="{1ED93439-536E-554E-15B1-B3EE3D721CBF}"/>
+              </a:ext>
+            </a:extLst>
+          </p:cNvPr>
+          <p:cNvSpPr txBox="1"/>
+          <p:nvPr/>
+        </p:nvSpPr>
+        <p:spPr>
+          <a:xfrm>
+            <a:off x="1025611" y="5942568"/>
+            <a:ext cx="1394228" cy="369332"/>
+          </a:xfrm>
+          <a:prstGeom prst="rect">
+            <a:avLst/>
+          </a:prstGeom>
+          <a:noFill/>
+        </p:spPr>
+        <p:txBody>
+          <a:bodyPr wrap="none" rtlCol="0">
+            <a:spAutoFit/>
+          </a:bodyPr>
+          <a:lstStyle/>
+          <a:p>
+            <a:r>
+              <a:rPr lang="en-CL"/>
+              <a:t>Fuente: BEA</a:t>
+            </a:r>
+            <a:endParaRPr lang="en-CL" dirty="0"/>
+          </a:p>
+        </p:txBody>
+      </p:sp>
+      <p:pic>
+        <p:nvPicPr>
+          <p:cNvPr id="6" name="Content Placeholder 5">
+            <a:extLst>
+              <a:ext uri="{FF2B5EF4-FFF2-40B4-BE49-F238E27FC236}">
+                <a16:creationId xmlns:a16="http://schemas.microsoft.com/office/drawing/2014/main" id="{BF8E4FA7-FADD-DABE-09D0-2DEB0058190E}"/>
+              </a:ext>
+            </a:extLst>
+          </p:cNvPr>
+          <p:cNvPicPr>
+            <a:picLocks noGrp="1" noChangeAspect="1"/>
+          </p:cNvPicPr>
+          <p:nvPr>
+            <p:ph idx="1"/>
+          </p:nvPr>
+        </p:nvPicPr>
+        <p:blipFill>
+          <a:blip r:embed="rId2"/>
+          <a:stretch>
+            <a:fillRect/>
+          </a:stretch>
+        </p:blipFill>
+        <p:spPr>
+          <a:xfrm>
+            <a:off x="0" y="1721068"/>
+            <a:ext cx="12037633" cy="3415863"/>
+          </a:xfrm>
+          <a:prstGeom prst="rect">
+            <a:avLst/>
+          </a:prstGeom>
+        </p:spPr>
+      </p:pic>
+    </p:spTree>
+    <p:extLst>
+      <p:ext uri="{BB962C8B-B14F-4D97-AF65-F5344CB8AC3E}">
+        <p14:creationId xmlns:p14="http://schemas.microsoft.com/office/powerpoint/2010/main" val="3435626507"/>
+      </p:ext>
+    </p:extLst>
+  </p:cSld>
+  <p:clrMapOvr>
+    <a:masterClrMapping/>
+  </p:clrMapOvr>
+</p:sld>
+</file>
+
+<file path=ppt/slides/slide12.xml><?xml version="1.0" encoding="utf-8"?>
 <p:sld xmlns:a="http://schemas.openxmlformats.org/drawingml/2006/main" xmlns:r="http://schemas.openxmlformats.org/officeDocument/2006/relationships" xmlns:p="http://schemas.openxmlformats.org/presentationml/2006/main">
   <p:cSld>
     <p:spTree>
@@ -4450,7 +5084,7 @@
 </p:sld>
 </file>
 
-<file path=ppt/slides/slide11.xml><?xml version="1.0" encoding="utf-8"?>
+<file path=ppt/slides/slide13.xml><?xml version="1.0" encoding="utf-8"?>
 <p:sld xmlns:a="http://schemas.openxmlformats.org/drawingml/2006/main" xmlns:r="http://schemas.openxmlformats.org/officeDocument/2006/relationships" xmlns:p="http://schemas.openxmlformats.org/presentationml/2006/main">
   <p:cSld>
     <p:spTree>
@@ -4537,7 +5171,7 @@
 </p:sld>
 </file>
 
-<file path=ppt/slides/slide12.xml><?xml version="1.0" encoding="utf-8"?>
+<file path=ppt/slides/slide14.xml><?xml version="1.0" encoding="utf-8"?>
 <p:sld xmlns:a="http://schemas.openxmlformats.org/drawingml/2006/main" xmlns:r="http://schemas.openxmlformats.org/officeDocument/2006/relationships" xmlns:p="http://schemas.openxmlformats.org/presentationml/2006/main">
   <p:cSld>
     <p:spTree>
@@ -4824,7 +5458,7 @@
 </p:sld>
 </file>
 
-<file path=ppt/slides/slide13.xml><?xml version="1.0" encoding="utf-8"?>
+<file path=ppt/slides/slide15.xml><?xml version="1.0" encoding="utf-8"?>
 <p:sld xmlns:a="http://schemas.openxmlformats.org/drawingml/2006/main" xmlns:r="http://schemas.openxmlformats.org/officeDocument/2006/relationships" xmlns:p="http://schemas.openxmlformats.org/presentationml/2006/main">
   <p:cSld>
     <p:spTree>
@@ -5051,7 +5685,7 @@
 </p:sld>
 </file>
 
-<file path=ppt/slides/slide14.xml><?xml version="1.0" encoding="utf-8"?>
+<file path=ppt/slides/slide16.xml><?xml version="1.0" encoding="utf-8"?>
 <p:sld xmlns:a="http://schemas.openxmlformats.org/drawingml/2006/main" xmlns:r="http://schemas.openxmlformats.org/officeDocument/2006/relationships" xmlns:p="http://schemas.openxmlformats.org/presentationml/2006/main">
   <p:cSld>
     <p:spTree>
@@ -5269,7 +5903,7 @@
 </p:sld>
 </file>
 
-<file path=ppt/slides/slide15.xml><?xml version="1.0" encoding="utf-8"?>
+<file path=ppt/slides/slide17.xml><?xml version="1.0" encoding="utf-8"?>
 <p:sld xmlns:a="http://schemas.openxmlformats.org/drawingml/2006/main" xmlns:r="http://schemas.openxmlformats.org/officeDocument/2006/relationships" xmlns:p="http://schemas.openxmlformats.org/presentationml/2006/main">
   <p:cSld>
     <p:spTree>
@@ -5618,7 +6252,7 @@
 </p:sld>
 </file>
 
-<file path=ppt/slides/slide16.xml><?xml version="1.0" encoding="utf-8"?>
+<file path=ppt/slides/slide18.xml><?xml version="1.0" encoding="utf-8"?>
 <p:sld xmlns:a="http://schemas.openxmlformats.org/drawingml/2006/main" xmlns:r="http://schemas.openxmlformats.org/officeDocument/2006/relationships" xmlns:p="http://schemas.openxmlformats.org/presentationml/2006/main">
   <p:cSld>
     <p:spTree>
@@ -5949,7 +6583,7 @@
 </p:sld>
 </file>
 
-<file path=ppt/slides/slide17.xml><?xml version="1.0" encoding="utf-8"?>
+<file path=ppt/slides/slide19.xml><?xml version="1.0" encoding="utf-8"?>
 <p:sld xmlns:a="http://schemas.openxmlformats.org/drawingml/2006/main" xmlns:r="http://schemas.openxmlformats.org/officeDocument/2006/relationships" xmlns:p="http://schemas.openxmlformats.org/presentationml/2006/main">
   <p:cSld>
     <p:spTree>
@@ -6191,7 +6825,382 @@
 </p:sld>
 </file>
 
-<file path=ppt/slides/slide18.xml><?xml version="1.0" encoding="utf-8"?>
+<file path=ppt/slides/slide2.xml><?xml version="1.0" encoding="utf-8"?>
+<p:sld xmlns:a="http://schemas.openxmlformats.org/drawingml/2006/main" xmlns:r="http://schemas.openxmlformats.org/officeDocument/2006/relationships" xmlns:p="http://schemas.openxmlformats.org/presentationml/2006/main">
+  <p:cSld>
+    <p:spTree>
+      <p:nvGrpSpPr>
+        <p:cNvPr id="1" name=""/>
+        <p:cNvGrpSpPr/>
+        <p:nvPr/>
+      </p:nvGrpSpPr>
+      <p:grpSpPr>
+        <a:xfrm>
+          <a:off x="0" y="0"/>
+          <a:ext cx="0" cy="0"/>
+          <a:chOff x="0" y="0"/>
+          <a:chExt cx="0" cy="0"/>
+        </a:xfrm>
+      </p:grpSpPr>
+      <p:sp>
+        <p:nvSpPr>
+          <p:cNvPr id="2" name="Title 1">
+            <a:extLst>
+              <a:ext uri="{FF2B5EF4-FFF2-40B4-BE49-F238E27FC236}">
+                <a16:creationId xmlns:a16="http://schemas.microsoft.com/office/drawing/2014/main" id="{A1A522A4-6BBC-2AA1-448A-EFB3B9C1F207}"/>
+              </a:ext>
+            </a:extLst>
+          </p:cNvPr>
+          <p:cNvSpPr>
+            <a:spLocks noGrp="1"/>
+          </p:cNvSpPr>
+          <p:nvPr>
+            <p:ph type="title"/>
+          </p:nvPr>
+        </p:nvSpPr>
+        <p:spPr/>
+        <p:txBody>
+          <a:bodyPr/>
+          <a:lstStyle/>
+          <a:p>
+            <a:r>
+              <a:rPr lang="en-CL" dirty="0"/>
+              <a:t>Los datos y el business cycle</a:t>
+            </a:r>
+          </a:p>
+        </p:txBody>
+      </p:sp>
+      <p:sp>
+        <p:nvSpPr>
+          <p:cNvPr id="3" name="Content Placeholder 2">
+            <a:extLst>
+              <a:ext uri="{FF2B5EF4-FFF2-40B4-BE49-F238E27FC236}">
+                <a16:creationId xmlns:a16="http://schemas.microsoft.com/office/drawing/2014/main" id="{03448D9E-3BD5-6311-DBA3-591715DBC772}"/>
+              </a:ext>
+            </a:extLst>
+          </p:cNvPr>
+          <p:cNvSpPr>
+            <a:spLocks noGrp="1"/>
+          </p:cNvSpPr>
+          <p:nvPr>
+            <p:ph idx="1"/>
+          </p:nvPr>
+        </p:nvSpPr>
+        <p:spPr/>
+        <p:txBody>
+          <a:bodyPr/>
+          <a:lstStyle/>
+          <a:p>
+            <a:r>
+              <a:rPr lang="en-CL" dirty="0"/>
+              <a:t>La convención es analizar datos desestacionarizados usando el HP filter (existen otros filtros que son igualmente útiles) </a:t>
+            </a:r>
+          </a:p>
+          <a:p>
+            <a:pPr lvl="1"/>
+            <a:r>
+              <a:rPr lang="en-CL" dirty="0"/>
+              <a:t>Datos incluyen pero no se limitan a: Producto, consumo, inversión, empleo, productividad, entre otros</a:t>
+            </a:r>
+          </a:p>
+          <a:p>
+            <a:pPr lvl="1"/>
+            <a:r>
+              <a:rPr lang="en-CL" dirty="0"/>
+              <a:t>Se mira la desviación con respecto a la tendencia calculada por HP</a:t>
+            </a:r>
+          </a:p>
+          <a:p>
+            <a:r>
+              <a:rPr lang="en-CL" dirty="0"/>
+              <a:t> </a:t>
+            </a:r>
+            <a:r>
+              <a:rPr lang="en-CL" i="1" dirty="0">
+                <a:solidFill>
+                  <a:srgbClr val="FF0000"/>
+                </a:solidFill>
+              </a:rPr>
+              <a:t>Business Cycle Moments: </a:t>
+            </a:r>
+            <a:r>
+              <a:rPr lang="en-CL" dirty="0"/>
+              <a:t>Usualmente se refiere a la volatilidad del ciclo (segundos momentos)</a:t>
+            </a:r>
+          </a:p>
+          <a:p>
+            <a:r>
+              <a:rPr lang="en-CL" dirty="0"/>
+              <a:t>También nos interesa la ciclicidad (correlación de la variable X con el PIB) y la persistencia (autocorrelación)</a:t>
+            </a:r>
+          </a:p>
+          <a:p>
+            <a:endParaRPr lang="en-CL" dirty="0"/>
+          </a:p>
+          <a:p>
+            <a:endParaRPr lang="en-CL" dirty="0"/>
+          </a:p>
+          <a:p>
+            <a:endParaRPr lang="en-US" dirty="0"/>
+          </a:p>
+        </p:txBody>
+      </p:sp>
+    </p:spTree>
+    <p:extLst>
+      <p:ext uri="{BB962C8B-B14F-4D97-AF65-F5344CB8AC3E}">
+        <p14:creationId xmlns:p14="http://schemas.microsoft.com/office/powerpoint/2010/main" val="938473022"/>
+      </p:ext>
+    </p:extLst>
+  </p:cSld>
+  <p:clrMapOvr>
+    <a:masterClrMapping/>
+  </p:clrMapOvr>
+  <p:timing>
+    <p:tnLst>
+      <p:par>
+        <p:cTn id="1" dur="indefinite" restart="never" nodeType="tmRoot">
+          <p:childTnLst>
+            <p:seq concurrent="1" nextAc="seek">
+              <p:cTn id="2" dur="indefinite" nodeType="mainSeq">
+                <p:childTnLst>
+                  <p:par>
+                    <p:cTn id="3" fill="hold">
+                      <p:stCondLst>
+                        <p:cond delay="indefinite"/>
+                      </p:stCondLst>
+                      <p:childTnLst>
+                        <p:par>
+                          <p:cTn id="4" fill="hold">
+                            <p:stCondLst>
+                              <p:cond delay="0"/>
+                            </p:stCondLst>
+                            <p:childTnLst>
+                              <p:par>
+                                <p:cTn id="5" presetID="1" presetClass="entr" presetSubtype="0" fill="hold" grpId="0" nodeType="clickEffect">
+                                  <p:stCondLst>
+                                    <p:cond delay="0"/>
+                                  </p:stCondLst>
+                                  <p:childTnLst>
+                                    <p:set>
+                                      <p:cBhvr>
+                                        <p:cTn id="6" dur="1" fill="hold">
+                                          <p:stCondLst>
+                                            <p:cond delay="0"/>
+                                          </p:stCondLst>
+                                        </p:cTn>
+                                        <p:tgtEl>
+                                          <p:spTgt spid="3">
+                                            <p:txEl>
+                                              <p:pRg st="0" end="0"/>
+                                            </p:txEl>
+                                          </p:spTgt>
+                                        </p:tgtEl>
+                                        <p:attrNameLst>
+                                          <p:attrName>style.visibility</p:attrName>
+                                        </p:attrNameLst>
+                                      </p:cBhvr>
+                                      <p:to>
+                                        <p:strVal val="visible"/>
+                                      </p:to>
+                                    </p:set>
+                                  </p:childTnLst>
+                                </p:cTn>
+                              </p:par>
+                              <p:par>
+                                <p:cTn id="7" presetID="1" presetClass="entr" presetSubtype="0" fill="hold" grpId="0" nodeType="withEffect">
+                                  <p:stCondLst>
+                                    <p:cond delay="0"/>
+                                  </p:stCondLst>
+                                  <p:childTnLst>
+                                    <p:set>
+                                      <p:cBhvr>
+                                        <p:cTn id="8" dur="1" fill="hold">
+                                          <p:stCondLst>
+                                            <p:cond delay="0"/>
+                                          </p:stCondLst>
+                                        </p:cTn>
+                                        <p:tgtEl>
+                                          <p:spTgt spid="3">
+                                            <p:txEl>
+                                              <p:pRg st="1" end="1"/>
+                                            </p:txEl>
+                                          </p:spTgt>
+                                        </p:tgtEl>
+                                        <p:attrNameLst>
+                                          <p:attrName>style.visibility</p:attrName>
+                                        </p:attrNameLst>
+                                      </p:cBhvr>
+                                      <p:to>
+                                        <p:strVal val="visible"/>
+                                      </p:to>
+                                    </p:set>
+                                  </p:childTnLst>
+                                </p:cTn>
+                              </p:par>
+                              <p:par>
+                                <p:cTn id="9" presetID="1" presetClass="entr" presetSubtype="0" fill="hold" grpId="0" nodeType="withEffect">
+                                  <p:stCondLst>
+                                    <p:cond delay="0"/>
+                                  </p:stCondLst>
+                                  <p:childTnLst>
+                                    <p:set>
+                                      <p:cBhvr>
+                                        <p:cTn id="10" dur="1" fill="hold">
+                                          <p:stCondLst>
+                                            <p:cond delay="0"/>
+                                          </p:stCondLst>
+                                        </p:cTn>
+                                        <p:tgtEl>
+                                          <p:spTgt spid="3">
+                                            <p:txEl>
+                                              <p:pRg st="2" end="2"/>
+                                            </p:txEl>
+                                          </p:spTgt>
+                                        </p:tgtEl>
+                                        <p:attrNameLst>
+                                          <p:attrName>style.visibility</p:attrName>
+                                        </p:attrNameLst>
+                                      </p:cBhvr>
+                                      <p:to>
+                                        <p:strVal val="visible"/>
+                                      </p:to>
+                                    </p:set>
+                                  </p:childTnLst>
+                                </p:cTn>
+                              </p:par>
+                            </p:childTnLst>
+                          </p:cTn>
+                        </p:par>
+                      </p:childTnLst>
+                    </p:cTn>
+                  </p:par>
+                  <p:par>
+                    <p:cTn id="11" fill="hold">
+                      <p:stCondLst>
+                        <p:cond delay="indefinite"/>
+                      </p:stCondLst>
+                      <p:childTnLst>
+                        <p:par>
+                          <p:cTn id="12" fill="hold">
+                            <p:stCondLst>
+                              <p:cond delay="0"/>
+                            </p:stCondLst>
+                            <p:childTnLst>
+                              <p:par>
+                                <p:cTn id="13" presetID="1" presetClass="entr" presetSubtype="0" fill="hold" grpId="0" nodeType="clickEffect">
+                                  <p:stCondLst>
+                                    <p:cond delay="0"/>
+                                  </p:stCondLst>
+                                  <p:childTnLst>
+                                    <p:set>
+                                      <p:cBhvr>
+                                        <p:cTn id="14" dur="1" fill="hold">
+                                          <p:stCondLst>
+                                            <p:cond delay="0"/>
+                                          </p:stCondLst>
+                                        </p:cTn>
+                                        <p:tgtEl>
+                                          <p:spTgt spid="3">
+                                            <p:txEl>
+                                              <p:pRg st="3" end="3"/>
+                                            </p:txEl>
+                                          </p:spTgt>
+                                        </p:tgtEl>
+                                        <p:attrNameLst>
+                                          <p:attrName>style.visibility</p:attrName>
+                                        </p:attrNameLst>
+                                      </p:cBhvr>
+                                      <p:to>
+                                        <p:strVal val="visible"/>
+                                      </p:to>
+                                    </p:set>
+                                  </p:childTnLst>
+                                </p:cTn>
+                              </p:par>
+                            </p:childTnLst>
+                          </p:cTn>
+                        </p:par>
+                      </p:childTnLst>
+                    </p:cTn>
+                  </p:par>
+                  <p:par>
+                    <p:cTn id="15" fill="hold">
+                      <p:stCondLst>
+                        <p:cond delay="indefinite"/>
+                      </p:stCondLst>
+                      <p:childTnLst>
+                        <p:par>
+                          <p:cTn id="16" fill="hold">
+                            <p:stCondLst>
+                              <p:cond delay="0"/>
+                            </p:stCondLst>
+                            <p:childTnLst>
+                              <p:par>
+                                <p:cTn id="17" presetID="1" presetClass="entr" presetSubtype="0" fill="hold" grpId="0" nodeType="clickEffect">
+                                  <p:stCondLst>
+                                    <p:cond delay="0"/>
+                                  </p:stCondLst>
+                                  <p:childTnLst>
+                                    <p:set>
+                                      <p:cBhvr>
+                                        <p:cTn id="18" dur="1" fill="hold">
+                                          <p:stCondLst>
+                                            <p:cond delay="0"/>
+                                          </p:stCondLst>
+                                        </p:cTn>
+                                        <p:tgtEl>
+                                          <p:spTgt spid="3">
+                                            <p:txEl>
+                                              <p:pRg st="4" end="4"/>
+                                            </p:txEl>
+                                          </p:spTgt>
+                                        </p:tgtEl>
+                                        <p:attrNameLst>
+                                          <p:attrName>style.visibility</p:attrName>
+                                        </p:attrNameLst>
+                                      </p:cBhvr>
+                                      <p:to>
+                                        <p:strVal val="visible"/>
+                                      </p:to>
+                                    </p:set>
+                                  </p:childTnLst>
+                                </p:cTn>
+                              </p:par>
+                            </p:childTnLst>
+                          </p:cTn>
+                        </p:par>
+                      </p:childTnLst>
+                    </p:cTn>
+                  </p:par>
+                </p:childTnLst>
+              </p:cTn>
+              <p:prevCondLst>
+                <p:cond evt="onPrev" delay="0">
+                  <p:tgtEl>
+                    <p:sldTgt/>
+                  </p:tgtEl>
+                </p:cond>
+              </p:prevCondLst>
+              <p:nextCondLst>
+                <p:cond evt="onNext" delay="0">
+                  <p:tgtEl>
+                    <p:sldTgt/>
+                  </p:tgtEl>
+                </p:cond>
+              </p:nextCondLst>
+            </p:seq>
+          </p:childTnLst>
+        </p:cTn>
+      </p:par>
+    </p:tnLst>
+    <p:bldLst>
+      <p:bldP spid="3" grpId="0" build="p"/>
+    </p:bldLst>
+  </p:timing>
+</p:sld>
+</file>
+
+<file path=ppt/slides/slide20.xml><?xml version="1.0" encoding="utf-8"?>
 <p:sld xmlns:a="http://schemas.openxmlformats.org/drawingml/2006/main" xmlns:r="http://schemas.openxmlformats.org/officeDocument/2006/relationships" xmlns:p="http://schemas.openxmlformats.org/presentationml/2006/main">
   <p:cSld>
     <p:spTree>
@@ -6836,7 +7845,7 @@
 </p:sld>
 </file>
 
-<file path=ppt/slides/slide19.xml><?xml version="1.0" encoding="utf-8"?>
+<file path=ppt/slides/slide21.xml><?xml version="1.0" encoding="utf-8"?>
 <p:sld xmlns:a="http://schemas.openxmlformats.org/drawingml/2006/main" xmlns:r="http://schemas.openxmlformats.org/officeDocument/2006/relationships" xmlns:p="http://schemas.openxmlformats.org/presentationml/2006/main">
   <p:cSld>
     <p:bg>
@@ -7557,7 +8566,7 @@
 </p:sld>
 </file>
 
-<file path=ppt/slides/slide2.xml><?xml version="1.0" encoding="utf-8"?>
+<file path=ppt/slides/slide22.xml><?xml version="1.0" encoding="utf-8"?>
 <p:sld xmlns:a="http://schemas.openxmlformats.org/drawingml/2006/main" xmlns:r="http://schemas.openxmlformats.org/officeDocument/2006/relationships" xmlns:p="http://schemas.openxmlformats.org/presentationml/2006/main">
   <p:cSld>
     <p:spTree>
@@ -7579,7 +8588,7 @@
           <p:cNvPr id="2" name="Title 1">
             <a:extLst>
               <a:ext uri="{FF2B5EF4-FFF2-40B4-BE49-F238E27FC236}">
-                <a16:creationId xmlns:a16="http://schemas.microsoft.com/office/drawing/2014/main" id="{A1A522A4-6BBC-2AA1-448A-EFB3B9C1F207}"/>
+                <a16:creationId xmlns:a16="http://schemas.microsoft.com/office/drawing/2014/main" id="{888F2524-095F-3632-428B-7AE0ED08BEBF}"/>
               </a:ext>
             </a:extLst>
           </p:cNvPr>
@@ -7597,381 +8606,6 @@
           <a:p>
             <a:r>
               <a:rPr lang="en-CL" dirty="0"/>
-              <a:t>Los datos y el business cycle</a:t>
-            </a:r>
-          </a:p>
-        </p:txBody>
-      </p:sp>
-      <p:sp>
-        <p:nvSpPr>
-          <p:cNvPr id="3" name="Content Placeholder 2">
-            <a:extLst>
-              <a:ext uri="{FF2B5EF4-FFF2-40B4-BE49-F238E27FC236}">
-                <a16:creationId xmlns:a16="http://schemas.microsoft.com/office/drawing/2014/main" id="{03448D9E-3BD5-6311-DBA3-591715DBC772}"/>
-              </a:ext>
-            </a:extLst>
-          </p:cNvPr>
-          <p:cNvSpPr>
-            <a:spLocks noGrp="1"/>
-          </p:cNvSpPr>
-          <p:nvPr>
-            <p:ph idx="1"/>
-          </p:nvPr>
-        </p:nvSpPr>
-        <p:spPr/>
-        <p:txBody>
-          <a:bodyPr/>
-          <a:lstStyle/>
-          <a:p>
-            <a:r>
-              <a:rPr lang="en-CL" dirty="0"/>
-              <a:t>La convención es analizar datos desestacionarizados usando el HP filter (existen otros filtros que son igualmente útiles) </a:t>
-            </a:r>
-          </a:p>
-          <a:p>
-            <a:pPr lvl="1"/>
-            <a:r>
-              <a:rPr lang="en-CL" dirty="0"/>
-              <a:t>Datos incluyen pero no se limitan a: Producto, consumo, inversión, empleo, productividad, entre otros</a:t>
-            </a:r>
-          </a:p>
-          <a:p>
-            <a:pPr lvl="1"/>
-            <a:r>
-              <a:rPr lang="en-CL" dirty="0"/>
-              <a:t>Se mira la desviación con respecto a la tendencia calculada por HP</a:t>
-            </a:r>
-          </a:p>
-          <a:p>
-            <a:r>
-              <a:rPr lang="en-CL" dirty="0"/>
-              <a:t> </a:t>
-            </a:r>
-            <a:r>
-              <a:rPr lang="en-CL" i="1" dirty="0">
-                <a:solidFill>
-                  <a:srgbClr val="FF0000"/>
-                </a:solidFill>
-              </a:rPr>
-              <a:t>Business Cycle Moments: </a:t>
-            </a:r>
-            <a:r>
-              <a:rPr lang="en-CL" dirty="0"/>
-              <a:t>Usualmente se refiere a la volatilidad del ciclo (segundos momentos)</a:t>
-            </a:r>
-          </a:p>
-          <a:p>
-            <a:r>
-              <a:rPr lang="en-CL" dirty="0"/>
-              <a:t>También nos interesa la ciclicidad (correlación de la variable X con el PIB) y la persistencia (autocorrelación)</a:t>
-            </a:r>
-          </a:p>
-          <a:p>
-            <a:endParaRPr lang="en-CL" dirty="0"/>
-          </a:p>
-          <a:p>
-            <a:endParaRPr lang="en-CL" dirty="0"/>
-          </a:p>
-          <a:p>
-            <a:endParaRPr lang="en-US" dirty="0"/>
-          </a:p>
-        </p:txBody>
-      </p:sp>
-    </p:spTree>
-    <p:extLst>
-      <p:ext uri="{BB962C8B-B14F-4D97-AF65-F5344CB8AC3E}">
-        <p14:creationId xmlns:p14="http://schemas.microsoft.com/office/powerpoint/2010/main" val="938473022"/>
-      </p:ext>
-    </p:extLst>
-  </p:cSld>
-  <p:clrMapOvr>
-    <a:masterClrMapping/>
-  </p:clrMapOvr>
-  <p:timing>
-    <p:tnLst>
-      <p:par>
-        <p:cTn id="1" dur="indefinite" restart="never" nodeType="tmRoot">
-          <p:childTnLst>
-            <p:seq concurrent="1" nextAc="seek">
-              <p:cTn id="2" dur="indefinite" nodeType="mainSeq">
-                <p:childTnLst>
-                  <p:par>
-                    <p:cTn id="3" fill="hold">
-                      <p:stCondLst>
-                        <p:cond delay="indefinite"/>
-                      </p:stCondLst>
-                      <p:childTnLst>
-                        <p:par>
-                          <p:cTn id="4" fill="hold">
-                            <p:stCondLst>
-                              <p:cond delay="0"/>
-                            </p:stCondLst>
-                            <p:childTnLst>
-                              <p:par>
-                                <p:cTn id="5" presetID="1" presetClass="entr" presetSubtype="0" fill="hold" grpId="0" nodeType="clickEffect">
-                                  <p:stCondLst>
-                                    <p:cond delay="0"/>
-                                  </p:stCondLst>
-                                  <p:childTnLst>
-                                    <p:set>
-                                      <p:cBhvr>
-                                        <p:cTn id="6" dur="1" fill="hold">
-                                          <p:stCondLst>
-                                            <p:cond delay="0"/>
-                                          </p:stCondLst>
-                                        </p:cTn>
-                                        <p:tgtEl>
-                                          <p:spTgt spid="3">
-                                            <p:txEl>
-                                              <p:pRg st="0" end="0"/>
-                                            </p:txEl>
-                                          </p:spTgt>
-                                        </p:tgtEl>
-                                        <p:attrNameLst>
-                                          <p:attrName>style.visibility</p:attrName>
-                                        </p:attrNameLst>
-                                      </p:cBhvr>
-                                      <p:to>
-                                        <p:strVal val="visible"/>
-                                      </p:to>
-                                    </p:set>
-                                  </p:childTnLst>
-                                </p:cTn>
-                              </p:par>
-                              <p:par>
-                                <p:cTn id="7" presetID="1" presetClass="entr" presetSubtype="0" fill="hold" grpId="0" nodeType="withEffect">
-                                  <p:stCondLst>
-                                    <p:cond delay="0"/>
-                                  </p:stCondLst>
-                                  <p:childTnLst>
-                                    <p:set>
-                                      <p:cBhvr>
-                                        <p:cTn id="8" dur="1" fill="hold">
-                                          <p:stCondLst>
-                                            <p:cond delay="0"/>
-                                          </p:stCondLst>
-                                        </p:cTn>
-                                        <p:tgtEl>
-                                          <p:spTgt spid="3">
-                                            <p:txEl>
-                                              <p:pRg st="1" end="1"/>
-                                            </p:txEl>
-                                          </p:spTgt>
-                                        </p:tgtEl>
-                                        <p:attrNameLst>
-                                          <p:attrName>style.visibility</p:attrName>
-                                        </p:attrNameLst>
-                                      </p:cBhvr>
-                                      <p:to>
-                                        <p:strVal val="visible"/>
-                                      </p:to>
-                                    </p:set>
-                                  </p:childTnLst>
-                                </p:cTn>
-                              </p:par>
-                              <p:par>
-                                <p:cTn id="9" presetID="1" presetClass="entr" presetSubtype="0" fill="hold" grpId="0" nodeType="withEffect">
-                                  <p:stCondLst>
-                                    <p:cond delay="0"/>
-                                  </p:stCondLst>
-                                  <p:childTnLst>
-                                    <p:set>
-                                      <p:cBhvr>
-                                        <p:cTn id="10" dur="1" fill="hold">
-                                          <p:stCondLst>
-                                            <p:cond delay="0"/>
-                                          </p:stCondLst>
-                                        </p:cTn>
-                                        <p:tgtEl>
-                                          <p:spTgt spid="3">
-                                            <p:txEl>
-                                              <p:pRg st="2" end="2"/>
-                                            </p:txEl>
-                                          </p:spTgt>
-                                        </p:tgtEl>
-                                        <p:attrNameLst>
-                                          <p:attrName>style.visibility</p:attrName>
-                                        </p:attrNameLst>
-                                      </p:cBhvr>
-                                      <p:to>
-                                        <p:strVal val="visible"/>
-                                      </p:to>
-                                    </p:set>
-                                  </p:childTnLst>
-                                </p:cTn>
-                              </p:par>
-                            </p:childTnLst>
-                          </p:cTn>
-                        </p:par>
-                      </p:childTnLst>
-                    </p:cTn>
-                  </p:par>
-                  <p:par>
-                    <p:cTn id="11" fill="hold">
-                      <p:stCondLst>
-                        <p:cond delay="indefinite"/>
-                      </p:stCondLst>
-                      <p:childTnLst>
-                        <p:par>
-                          <p:cTn id="12" fill="hold">
-                            <p:stCondLst>
-                              <p:cond delay="0"/>
-                            </p:stCondLst>
-                            <p:childTnLst>
-                              <p:par>
-                                <p:cTn id="13" presetID="1" presetClass="entr" presetSubtype="0" fill="hold" grpId="0" nodeType="clickEffect">
-                                  <p:stCondLst>
-                                    <p:cond delay="0"/>
-                                  </p:stCondLst>
-                                  <p:childTnLst>
-                                    <p:set>
-                                      <p:cBhvr>
-                                        <p:cTn id="14" dur="1" fill="hold">
-                                          <p:stCondLst>
-                                            <p:cond delay="0"/>
-                                          </p:stCondLst>
-                                        </p:cTn>
-                                        <p:tgtEl>
-                                          <p:spTgt spid="3">
-                                            <p:txEl>
-                                              <p:pRg st="3" end="3"/>
-                                            </p:txEl>
-                                          </p:spTgt>
-                                        </p:tgtEl>
-                                        <p:attrNameLst>
-                                          <p:attrName>style.visibility</p:attrName>
-                                        </p:attrNameLst>
-                                      </p:cBhvr>
-                                      <p:to>
-                                        <p:strVal val="visible"/>
-                                      </p:to>
-                                    </p:set>
-                                  </p:childTnLst>
-                                </p:cTn>
-                              </p:par>
-                            </p:childTnLst>
-                          </p:cTn>
-                        </p:par>
-                      </p:childTnLst>
-                    </p:cTn>
-                  </p:par>
-                  <p:par>
-                    <p:cTn id="15" fill="hold">
-                      <p:stCondLst>
-                        <p:cond delay="indefinite"/>
-                      </p:stCondLst>
-                      <p:childTnLst>
-                        <p:par>
-                          <p:cTn id="16" fill="hold">
-                            <p:stCondLst>
-                              <p:cond delay="0"/>
-                            </p:stCondLst>
-                            <p:childTnLst>
-                              <p:par>
-                                <p:cTn id="17" presetID="1" presetClass="entr" presetSubtype="0" fill="hold" grpId="0" nodeType="clickEffect">
-                                  <p:stCondLst>
-                                    <p:cond delay="0"/>
-                                  </p:stCondLst>
-                                  <p:childTnLst>
-                                    <p:set>
-                                      <p:cBhvr>
-                                        <p:cTn id="18" dur="1" fill="hold">
-                                          <p:stCondLst>
-                                            <p:cond delay="0"/>
-                                          </p:stCondLst>
-                                        </p:cTn>
-                                        <p:tgtEl>
-                                          <p:spTgt spid="3">
-                                            <p:txEl>
-                                              <p:pRg st="4" end="4"/>
-                                            </p:txEl>
-                                          </p:spTgt>
-                                        </p:tgtEl>
-                                        <p:attrNameLst>
-                                          <p:attrName>style.visibility</p:attrName>
-                                        </p:attrNameLst>
-                                      </p:cBhvr>
-                                      <p:to>
-                                        <p:strVal val="visible"/>
-                                      </p:to>
-                                    </p:set>
-                                  </p:childTnLst>
-                                </p:cTn>
-                              </p:par>
-                            </p:childTnLst>
-                          </p:cTn>
-                        </p:par>
-                      </p:childTnLst>
-                    </p:cTn>
-                  </p:par>
-                </p:childTnLst>
-              </p:cTn>
-              <p:prevCondLst>
-                <p:cond evt="onPrev" delay="0">
-                  <p:tgtEl>
-                    <p:sldTgt/>
-                  </p:tgtEl>
-                </p:cond>
-              </p:prevCondLst>
-              <p:nextCondLst>
-                <p:cond evt="onNext" delay="0">
-                  <p:tgtEl>
-                    <p:sldTgt/>
-                  </p:tgtEl>
-                </p:cond>
-              </p:nextCondLst>
-            </p:seq>
-          </p:childTnLst>
-        </p:cTn>
-      </p:par>
-    </p:tnLst>
-    <p:bldLst>
-      <p:bldP spid="3" grpId="0" build="p"/>
-    </p:bldLst>
-  </p:timing>
-</p:sld>
-</file>
-
-<file path=ppt/slides/slide20.xml><?xml version="1.0" encoding="utf-8"?>
-<p:sld xmlns:a="http://schemas.openxmlformats.org/drawingml/2006/main" xmlns:r="http://schemas.openxmlformats.org/officeDocument/2006/relationships" xmlns:p="http://schemas.openxmlformats.org/presentationml/2006/main">
-  <p:cSld>
-    <p:spTree>
-      <p:nvGrpSpPr>
-        <p:cNvPr id="1" name=""/>
-        <p:cNvGrpSpPr/>
-        <p:nvPr/>
-      </p:nvGrpSpPr>
-      <p:grpSpPr>
-        <a:xfrm>
-          <a:off x="0" y="0"/>
-          <a:ext cx="0" cy="0"/>
-          <a:chOff x="0" y="0"/>
-          <a:chExt cx="0" cy="0"/>
-        </a:xfrm>
-      </p:grpSpPr>
-      <p:sp>
-        <p:nvSpPr>
-          <p:cNvPr id="2" name="Title 1">
-            <a:extLst>
-              <a:ext uri="{FF2B5EF4-FFF2-40B4-BE49-F238E27FC236}">
-                <a16:creationId xmlns:a16="http://schemas.microsoft.com/office/drawing/2014/main" id="{888F2524-095F-3632-428B-7AE0ED08BEBF}"/>
-              </a:ext>
-            </a:extLst>
-          </p:cNvPr>
-          <p:cNvSpPr>
-            <a:spLocks noGrp="1"/>
-          </p:cNvSpPr>
-          <p:nvPr>
-            <p:ph type="title"/>
-          </p:nvPr>
-        </p:nvSpPr>
-        <p:spPr/>
-        <p:txBody>
-          <a:bodyPr/>
-          <a:lstStyle/>
-          <a:p>
-            <a:r>
-              <a:rPr lang="en-CL" dirty="0"/>
               <a:t>Resultados de Dynare</a:t>
             </a:r>
           </a:p>
@@ -7979,10 +8613,10 @@
       </p:sp>
       <p:pic>
         <p:nvPicPr>
-          <p:cNvPr id="4" name="Picture 3">
-            <a:extLst>
-              <a:ext uri="{FF2B5EF4-FFF2-40B4-BE49-F238E27FC236}">
-                <a16:creationId xmlns:a16="http://schemas.microsoft.com/office/drawing/2014/main" id="{6D7396C3-E439-76AB-E5D7-B5DC83413848}"/>
+          <p:cNvPr id="5" name="Picture 4">
+            <a:extLst>
+              <a:ext uri="{FF2B5EF4-FFF2-40B4-BE49-F238E27FC236}">
+                <a16:creationId xmlns:a16="http://schemas.microsoft.com/office/drawing/2014/main" id="{C831FBC9-581F-3C5E-363C-9829D2096845}"/>
               </a:ext>
             </a:extLst>
           </p:cNvPr>
@@ -7999,8 +8633,8 @@
         </p:blipFill>
         <p:spPr>
           <a:xfrm>
-            <a:off x="838200" y="2235930"/>
-            <a:ext cx="10591752" cy="3386394"/>
+            <a:off x="1286203" y="1816812"/>
+            <a:ext cx="9619593" cy="3527184"/>
           </a:xfrm>
           <a:prstGeom prst="rect">
             <a:avLst/>
@@ -8020,7 +8654,7 @@
 </p:sld>
 </file>
 
-<file path=ppt/slides/slide21.xml><?xml version="1.0" encoding="utf-8"?>
+<file path=ppt/slides/slide23.xml><?xml version="1.0" encoding="utf-8"?>
 <p:sld xmlns:a="http://schemas.openxmlformats.org/drawingml/2006/main" xmlns:r="http://schemas.openxmlformats.org/officeDocument/2006/relationships" xmlns:p="http://schemas.openxmlformats.org/presentationml/2006/main">
   <p:cSld>
     <p:spTree>
@@ -8616,7 +9250,7 @@
 </p:sld>
 </file>
 
-<file path=ppt/slides/slide22.xml><?xml version="1.0" encoding="utf-8"?>
+<file path=ppt/slides/slide24.xml><?xml version="1.0" encoding="utf-8"?>
 <p:sld xmlns:a="http://schemas.openxmlformats.org/drawingml/2006/main" xmlns:r="http://schemas.openxmlformats.org/officeDocument/2006/relationships" xmlns:p="http://schemas.openxmlformats.org/presentationml/2006/main">
   <p:cSld>
     <p:spTree>
@@ -8799,7 +9433,7 @@
 </p:sld>
 </file>
 
-<file path=ppt/slides/slide23.xml><?xml version="1.0" encoding="utf-8"?>
+<file path=ppt/slides/slide25.xml><?xml version="1.0" encoding="utf-8"?>
 <p:sld xmlns:a="http://schemas.openxmlformats.org/drawingml/2006/main" xmlns:r="http://schemas.openxmlformats.org/officeDocument/2006/relationships" xmlns:p="http://schemas.openxmlformats.org/presentationml/2006/main">
   <p:cSld>
     <p:spTree>
@@ -9085,7 +9719,7 @@
 </p:sld>
 </file>
 
-<file path=ppt/slides/slide24.xml><?xml version="1.0" encoding="utf-8"?>
+<file path=ppt/slides/slide26.xml><?xml version="1.0" encoding="utf-8"?>
 <p:sld xmlns:a="http://schemas.openxmlformats.org/drawingml/2006/main" xmlns:r="http://schemas.openxmlformats.org/officeDocument/2006/relationships" xmlns:p="http://schemas.openxmlformats.org/presentationml/2006/main">
   <p:cSld>
     <p:spTree>
@@ -9228,7 +9862,7 @@
 </p:sld>
 </file>
 
-<file path=ppt/slides/slide25.xml><?xml version="1.0" encoding="utf-8"?>
+<file path=ppt/slides/slide27.xml><?xml version="1.0" encoding="utf-8"?>
 <p:sld xmlns:a="http://schemas.openxmlformats.org/drawingml/2006/main" xmlns:r="http://schemas.openxmlformats.org/officeDocument/2006/relationships" xmlns:p="http://schemas.openxmlformats.org/presentationml/2006/main">
   <p:cSld>
     <p:spTree>
@@ -9543,7 +10177,7 @@
 </p:sld>
 </file>
 
-<file path=ppt/slides/slide26.xml><?xml version="1.0" encoding="utf-8"?>
+<file path=ppt/slides/slide28.xml><?xml version="1.0" encoding="utf-8"?>
 <p:sld xmlns:a="http://schemas.openxmlformats.org/drawingml/2006/main" xmlns:r="http://schemas.openxmlformats.org/officeDocument/2006/relationships" xmlns:p="http://schemas.openxmlformats.org/presentationml/2006/main">
   <p:cSld>
     <p:spTree>
@@ -9775,7 +10409,7 @@
 </p:sld>
 </file>
 
-<file path=ppt/slides/slide27.xml><?xml version="1.0" encoding="utf-8"?>
+<file path=ppt/slides/slide29.xml><?xml version="1.0" encoding="utf-8"?>
 <p:sld xmlns:a="http://schemas.openxmlformats.org/drawingml/2006/main" xmlns:r="http://schemas.openxmlformats.org/officeDocument/2006/relationships" xmlns:p="http://schemas.openxmlformats.org/presentationml/2006/main">
   <p:cSld>
     <p:spTree>
@@ -10059,127 +10693,6 @@
     <p:extLst>
       <p:ext uri="{BB962C8B-B14F-4D97-AF65-F5344CB8AC3E}">
         <p14:creationId xmlns:p14="http://schemas.microsoft.com/office/powerpoint/2010/main" val="824782825"/>
-      </p:ext>
-    </p:extLst>
-  </p:cSld>
-  <p:clrMapOvr>
-    <a:masterClrMapping/>
-  </p:clrMapOvr>
-</p:sld>
-</file>
-
-<file path=ppt/slides/slide28.xml><?xml version="1.0" encoding="utf-8"?>
-<p:sld xmlns:a="http://schemas.openxmlformats.org/drawingml/2006/main" xmlns:r="http://schemas.openxmlformats.org/officeDocument/2006/relationships" xmlns:p="http://schemas.openxmlformats.org/presentationml/2006/main">
-  <p:cSld>
-    <p:spTree>
-      <p:nvGrpSpPr>
-        <p:cNvPr id="1" name=""/>
-        <p:cNvGrpSpPr/>
-        <p:nvPr/>
-      </p:nvGrpSpPr>
-      <p:grpSpPr>
-        <a:xfrm>
-          <a:off x="0" y="0"/>
-          <a:ext cx="0" cy="0"/>
-          <a:chOff x="0" y="0"/>
-          <a:chExt cx="0" cy="0"/>
-        </a:xfrm>
-      </p:grpSpPr>
-      <p:sp>
-        <p:nvSpPr>
-          <p:cNvPr id="2" name="Title 1">
-            <a:extLst>
-              <a:ext uri="{FF2B5EF4-FFF2-40B4-BE49-F238E27FC236}">
-                <a16:creationId xmlns:a16="http://schemas.microsoft.com/office/drawing/2014/main" id="{27DF6C3D-D6AD-07D7-2B4C-D2BDCB42701E}"/>
-              </a:ext>
-            </a:extLst>
-          </p:cNvPr>
-          <p:cNvSpPr>
-            <a:spLocks noGrp="1"/>
-          </p:cNvSpPr>
-          <p:nvPr>
-            <p:ph type="title"/>
-          </p:nvPr>
-        </p:nvSpPr>
-        <p:spPr/>
-        <p:txBody>
-          <a:bodyPr/>
-          <a:lstStyle/>
-          <a:p>
-            <a:r>
-              <a:rPr lang="en-CL" dirty="0"/>
-              <a:t>Dynare</a:t>
-            </a:r>
-          </a:p>
-        </p:txBody>
-      </p:sp>
-      <p:sp>
-        <p:nvSpPr>
-          <p:cNvPr id="3" name="Content Placeholder 2">
-            <a:extLst>
-              <a:ext uri="{FF2B5EF4-FFF2-40B4-BE49-F238E27FC236}">
-                <a16:creationId xmlns:a16="http://schemas.microsoft.com/office/drawing/2014/main" id="{B5375422-F53B-B9F0-F011-843EB0777549}"/>
-              </a:ext>
-            </a:extLst>
-          </p:cNvPr>
-          <p:cNvSpPr>
-            <a:spLocks noGrp="1"/>
-          </p:cNvSpPr>
-          <p:nvPr>
-            <p:ph idx="1"/>
-          </p:nvPr>
-        </p:nvSpPr>
-        <p:spPr>
-          <a:xfrm>
-            <a:off x="838200" y="5483225"/>
-            <a:ext cx="9800968" cy="880505"/>
-          </a:xfrm>
-        </p:spPr>
-        <p:txBody>
-          <a:bodyPr/>
-          <a:lstStyle/>
-          <a:p>
-            <a:r>
-              <a:rPr lang="en-CL" dirty="0"/>
-              <a:t>Asumiendo que la elasticidad de Frisch es 1, el modelo genera aún menos amplificación. </a:t>
-            </a:r>
-          </a:p>
-        </p:txBody>
-      </p:sp>
-      <p:pic>
-        <p:nvPicPr>
-          <p:cNvPr id="4" name="Picture 3">
-            <a:extLst>
-              <a:ext uri="{FF2B5EF4-FFF2-40B4-BE49-F238E27FC236}">
-                <a16:creationId xmlns:a16="http://schemas.microsoft.com/office/drawing/2014/main" id="{A45F7447-11F1-9B7E-535B-FE43084C0C08}"/>
-              </a:ext>
-            </a:extLst>
-          </p:cNvPr>
-          <p:cNvPicPr>
-            <a:picLocks noChangeAspect="1"/>
-          </p:cNvPicPr>
-          <p:nvPr/>
-        </p:nvPicPr>
-        <p:blipFill>
-          <a:blip r:embed="rId2"/>
-          <a:stretch>
-            <a:fillRect/>
-          </a:stretch>
-        </p:blipFill>
-        <p:spPr>
-          <a:xfrm>
-            <a:off x="3435350" y="1690688"/>
-            <a:ext cx="5321300" cy="3606800"/>
-          </a:xfrm>
-          <a:prstGeom prst="rect">
-            <a:avLst/>
-          </a:prstGeom>
-        </p:spPr>
-      </p:pic>
-    </p:spTree>
-    <p:extLst>
-      <p:ext uri="{BB962C8B-B14F-4D97-AF65-F5344CB8AC3E}">
-        <p14:creationId xmlns:p14="http://schemas.microsoft.com/office/powerpoint/2010/main" val="311335858"/>
       </p:ext>
     </p:extLst>
   </p:cSld>
@@ -10745,6 +11258,129 @@
 </p:sld>
 </file>
 
+<file path=ppt/slides/slide30.xml><?xml version="1.0" encoding="utf-8"?>
+<p:sld xmlns:a="http://schemas.openxmlformats.org/drawingml/2006/main" xmlns:r="http://schemas.openxmlformats.org/officeDocument/2006/relationships" xmlns:p="http://schemas.openxmlformats.org/presentationml/2006/main">
+  <p:cSld>
+    <p:spTree>
+      <p:nvGrpSpPr>
+        <p:cNvPr id="1" name=""/>
+        <p:cNvGrpSpPr/>
+        <p:nvPr/>
+      </p:nvGrpSpPr>
+      <p:grpSpPr>
+        <a:xfrm>
+          <a:off x="0" y="0"/>
+          <a:ext cx="0" cy="0"/>
+          <a:chOff x="0" y="0"/>
+          <a:chExt cx="0" cy="0"/>
+        </a:xfrm>
+      </p:grpSpPr>
+      <p:sp>
+        <p:nvSpPr>
+          <p:cNvPr id="2" name="Title 1">
+            <a:extLst>
+              <a:ext uri="{FF2B5EF4-FFF2-40B4-BE49-F238E27FC236}">
+                <a16:creationId xmlns:a16="http://schemas.microsoft.com/office/drawing/2014/main" id="{27DF6C3D-D6AD-07D7-2B4C-D2BDCB42701E}"/>
+              </a:ext>
+            </a:extLst>
+          </p:cNvPr>
+          <p:cNvSpPr>
+            <a:spLocks noGrp="1"/>
+          </p:cNvSpPr>
+          <p:nvPr>
+            <p:ph type="title"/>
+          </p:nvPr>
+        </p:nvSpPr>
+        <p:spPr/>
+        <p:txBody>
+          <a:bodyPr/>
+          <a:lstStyle/>
+          <a:p>
+            <a:r>
+              <a:rPr lang="en-CL"/>
+              <a:t>Dynare</a:t>
+            </a:r>
+            <a:endParaRPr lang="en-CL" dirty="0"/>
+          </a:p>
+        </p:txBody>
+      </p:sp>
+      <p:sp>
+        <p:nvSpPr>
+          <p:cNvPr id="3" name="Content Placeholder 2">
+            <a:extLst>
+              <a:ext uri="{FF2B5EF4-FFF2-40B4-BE49-F238E27FC236}">
+                <a16:creationId xmlns:a16="http://schemas.microsoft.com/office/drawing/2014/main" id="{B5375422-F53B-B9F0-F011-843EB0777549}"/>
+              </a:ext>
+            </a:extLst>
+          </p:cNvPr>
+          <p:cNvSpPr>
+            <a:spLocks noGrp="1"/>
+          </p:cNvSpPr>
+          <p:nvPr>
+            <p:ph idx="1"/>
+          </p:nvPr>
+        </p:nvSpPr>
+        <p:spPr>
+          <a:xfrm>
+            <a:off x="838200" y="5483225"/>
+            <a:ext cx="9800968" cy="880505"/>
+          </a:xfrm>
+        </p:spPr>
+        <p:txBody>
+          <a:bodyPr/>
+          <a:lstStyle/>
+          <a:p>
+            <a:r>
+              <a:rPr lang="en-CL"/>
+              <a:t>Asumiendo que la elasticidad de Frisch es 1, el modelo genera aún menos amplificación. </a:t>
+            </a:r>
+            <a:endParaRPr lang="en-CL" dirty="0"/>
+          </a:p>
+        </p:txBody>
+      </p:sp>
+      <p:pic>
+        <p:nvPicPr>
+          <p:cNvPr id="5" name="Picture 4">
+            <a:extLst>
+              <a:ext uri="{FF2B5EF4-FFF2-40B4-BE49-F238E27FC236}">
+                <a16:creationId xmlns:a16="http://schemas.microsoft.com/office/drawing/2014/main" id="{438E7B00-CEF9-E99A-47A0-542CDF142CE5}"/>
+              </a:ext>
+            </a:extLst>
+          </p:cNvPr>
+          <p:cNvPicPr>
+            <a:picLocks noChangeAspect="1"/>
+          </p:cNvPicPr>
+          <p:nvPr/>
+        </p:nvPicPr>
+        <p:blipFill>
+          <a:blip r:embed="rId2"/>
+          <a:stretch>
+            <a:fillRect/>
+          </a:stretch>
+        </p:blipFill>
+        <p:spPr>
+          <a:xfrm>
+            <a:off x="738865" y="1471732"/>
+            <a:ext cx="10714269" cy="3626880"/>
+          </a:xfrm>
+          <a:prstGeom prst="rect">
+            <a:avLst/>
+          </a:prstGeom>
+        </p:spPr>
+      </p:pic>
+    </p:spTree>
+    <p:extLst>
+      <p:ext uri="{BB962C8B-B14F-4D97-AF65-F5344CB8AC3E}">
+        <p14:creationId xmlns:p14="http://schemas.microsoft.com/office/powerpoint/2010/main" val="311335858"/>
+      </p:ext>
+    </p:extLst>
+  </p:cSld>
+  <p:clrMapOvr>
+    <a:masterClrMapping/>
+  </p:clrMapOvr>
+</p:sld>
+</file>
+
 <file path=ppt/slides/slide4.xml><?xml version="1.0" encoding="utf-8"?>
 <p:sld xmlns:a="http://schemas.openxmlformats.org/drawingml/2006/main" xmlns:r="http://schemas.openxmlformats.org/officeDocument/2006/relationships" xmlns:p="http://schemas.openxmlformats.org/presentationml/2006/main">
   <p:cSld>
@@ -11450,6 +12086,149 @@
 </file>
 
 <file path=ppt/slides/slide6.xml><?xml version="1.0" encoding="utf-8"?>
+<p:sld xmlns:a="http://schemas.openxmlformats.org/drawingml/2006/main" xmlns:r="http://schemas.openxmlformats.org/officeDocument/2006/relationships" xmlns:p="http://schemas.openxmlformats.org/presentationml/2006/main">
+  <p:cSld>
+    <p:spTree>
+      <p:nvGrpSpPr>
+        <p:cNvPr id="1" name=""/>
+        <p:cNvGrpSpPr/>
+        <p:nvPr/>
+      </p:nvGrpSpPr>
+      <p:grpSpPr>
+        <a:xfrm>
+          <a:off x="0" y="0"/>
+          <a:ext cx="0" cy="0"/>
+          <a:chOff x="0" y="0"/>
+          <a:chExt cx="0" cy="0"/>
+        </a:xfrm>
+      </p:grpSpPr>
+      <p:sp>
+        <p:nvSpPr>
+          <p:cNvPr id="2" name="Title 1">
+            <a:extLst>
+              <a:ext uri="{FF2B5EF4-FFF2-40B4-BE49-F238E27FC236}">
+                <a16:creationId xmlns:a16="http://schemas.microsoft.com/office/drawing/2014/main" id="{1A8DA5ED-9F45-63FB-9A75-2B9C08FC4560}"/>
+              </a:ext>
+            </a:extLst>
+          </p:cNvPr>
+          <p:cNvSpPr>
+            <a:spLocks noGrp="1"/>
+          </p:cNvSpPr>
+          <p:nvPr>
+            <p:ph type="title"/>
+          </p:nvPr>
+        </p:nvSpPr>
+        <p:spPr>
+          <a:xfrm>
+            <a:off x="417095" y="127584"/>
+            <a:ext cx="10515600" cy="1325563"/>
+          </a:xfrm>
+        </p:spPr>
+        <p:txBody>
+          <a:bodyPr/>
+          <a:lstStyle/>
+          <a:p>
+            <a:r>
+              <a:rPr lang="en-US" dirty="0"/>
+              <a:t>TFP </a:t>
+            </a:r>
+            <a:r>
+              <a:rPr lang="en-US" dirty="0" err="1"/>
+              <a:t>en</a:t>
+            </a:r>
+            <a:r>
+              <a:rPr lang="en-US" dirty="0"/>
+              <a:t> </a:t>
+            </a:r>
+            <a:r>
+              <a:rPr lang="en-US" dirty="0" err="1"/>
+              <a:t>los</a:t>
+            </a:r>
+            <a:r>
+              <a:rPr lang="en-US" dirty="0"/>
+              <a:t> </a:t>
+            </a:r>
+            <a:r>
+              <a:rPr lang="en-US" dirty="0" err="1"/>
+              <a:t>datos</a:t>
+            </a:r>
+            <a:r>
+              <a:rPr lang="en-US"/>
+              <a:t>:</a:t>
+            </a:r>
+            <a:endParaRPr lang="en-US" dirty="0"/>
+          </a:p>
+        </p:txBody>
+      </p:sp>
+      <p:sp>
+        <p:nvSpPr>
+          <p:cNvPr id="6" name="Content Placeholder 5">
+            <a:extLst>
+              <a:ext uri="{FF2B5EF4-FFF2-40B4-BE49-F238E27FC236}">
+                <a16:creationId xmlns:a16="http://schemas.microsoft.com/office/drawing/2014/main" id="{982C3F73-F7A2-0280-4EC7-8F26C58F4543}"/>
+              </a:ext>
+            </a:extLst>
+          </p:cNvPr>
+          <p:cNvSpPr>
+            <a:spLocks noGrp="1"/>
+          </p:cNvSpPr>
+          <p:nvPr>
+            <p:ph idx="1"/>
+          </p:nvPr>
+        </p:nvSpPr>
+        <p:spPr/>
+        <p:txBody>
+          <a:bodyPr/>
+          <a:lstStyle/>
+          <a:p>
+            <a:endParaRPr lang="en-US" dirty="0"/>
+          </a:p>
+        </p:txBody>
+      </p:sp>
+      <p:pic>
+        <p:nvPicPr>
+          <p:cNvPr id="7" name="Picture 6">
+            <a:extLst>
+              <a:ext uri="{FF2B5EF4-FFF2-40B4-BE49-F238E27FC236}">
+                <a16:creationId xmlns:a16="http://schemas.microsoft.com/office/drawing/2014/main" id="{CCAE49E7-FC15-2D26-86D8-3353B75CEBA0}"/>
+              </a:ext>
+            </a:extLst>
+          </p:cNvPr>
+          <p:cNvPicPr>
+            <a:picLocks noChangeAspect="1"/>
+          </p:cNvPicPr>
+          <p:nvPr/>
+        </p:nvPicPr>
+        <p:blipFill>
+          <a:blip r:embed="rId2"/>
+          <a:stretch>
+            <a:fillRect/>
+          </a:stretch>
+        </p:blipFill>
+        <p:spPr>
+          <a:xfrm>
+            <a:off x="2407987" y="1477963"/>
+            <a:ext cx="6870700" cy="4699000"/>
+          </a:xfrm>
+          <a:prstGeom prst="rect">
+            <a:avLst/>
+          </a:prstGeom>
+        </p:spPr>
+      </p:pic>
+    </p:spTree>
+    <p:extLst>
+      <p:ext uri="{BB962C8B-B14F-4D97-AF65-F5344CB8AC3E}">
+        <p14:creationId xmlns:p14="http://schemas.microsoft.com/office/powerpoint/2010/main" val="141498960"/>
+      </p:ext>
+    </p:extLst>
+  </p:cSld>
+  <p:clrMapOvr>
+    <a:masterClrMapping/>
+  </p:clrMapOvr>
+</p:sld>
+</file>
+
+<file path=ppt/slides/slide7.xml><?xml version="1.0" encoding="utf-8"?>
 <p:sld xmlns:a="http://schemas.openxmlformats.org/drawingml/2006/main" xmlns:r="http://schemas.openxmlformats.org/officeDocument/2006/relationships" xmlns:p="http://schemas.openxmlformats.org/presentationml/2006/main">
   <p:cSld>
     <p:spTree>
@@ -11836,7 +12615,7 @@
 </p:sld>
 </file>
 
-<file path=ppt/slides/slide7.xml><?xml version="1.0" encoding="utf-8"?>
+<file path=ppt/slides/slide8.xml><?xml version="1.0" encoding="utf-8"?>
 <p:sld xmlns:a="http://schemas.openxmlformats.org/drawingml/2006/main" xmlns:r="http://schemas.openxmlformats.org/officeDocument/2006/relationships" xmlns:p="http://schemas.openxmlformats.org/presentationml/2006/main">
   <p:cSld>
     <p:spTree>
@@ -11997,107 +12776,6 @@
 </p:sld>
 </file>
 
-<file path=ppt/slides/slide8.xml><?xml version="1.0" encoding="utf-8"?>
-<p:sld xmlns:a="http://schemas.openxmlformats.org/drawingml/2006/main" xmlns:r="http://schemas.openxmlformats.org/officeDocument/2006/relationships" xmlns:p="http://schemas.openxmlformats.org/presentationml/2006/main">
-  <p:cSld>
-    <p:spTree>
-      <p:nvGrpSpPr>
-        <p:cNvPr id="1" name=""/>
-        <p:cNvGrpSpPr/>
-        <p:nvPr/>
-      </p:nvGrpSpPr>
-      <p:grpSpPr>
-        <a:xfrm>
-          <a:off x="0" y="0"/>
-          <a:ext cx="0" cy="0"/>
-          <a:chOff x="0" y="0"/>
-          <a:chExt cx="0" cy="0"/>
-        </a:xfrm>
-      </p:grpSpPr>
-      <p:sp>
-        <p:nvSpPr>
-          <p:cNvPr id="2" name="Title 1">
-            <a:extLst>
-              <a:ext uri="{FF2B5EF4-FFF2-40B4-BE49-F238E27FC236}">
-                <a16:creationId xmlns:a16="http://schemas.microsoft.com/office/drawing/2014/main" id="{6FF43062-C0D7-FFEA-1ECA-F48B897E1C79}"/>
-              </a:ext>
-            </a:extLst>
-          </p:cNvPr>
-          <p:cNvSpPr>
-            <a:spLocks noGrp="1"/>
-          </p:cNvSpPr>
-          <p:nvPr>
-            <p:ph type="title"/>
-          </p:nvPr>
-        </p:nvSpPr>
-        <p:spPr/>
-        <p:txBody>
-          <a:bodyPr/>
-          <a:lstStyle/>
-          <a:p>
-            <a:r>
-              <a:rPr lang="en-CL" dirty="0"/>
-              <a:t>Otras variables</a:t>
-            </a:r>
-          </a:p>
-        </p:txBody>
-      </p:sp>
-      <p:sp>
-        <p:nvSpPr>
-          <p:cNvPr id="3" name="Content Placeholder 2">
-            <a:extLst>
-              <a:ext uri="{FF2B5EF4-FFF2-40B4-BE49-F238E27FC236}">
-                <a16:creationId xmlns:a16="http://schemas.microsoft.com/office/drawing/2014/main" id="{E3C2561A-0818-AAA3-A909-A96D84C51F2C}"/>
-              </a:ext>
-            </a:extLst>
-          </p:cNvPr>
-          <p:cNvSpPr>
-            <a:spLocks noGrp="1"/>
-          </p:cNvSpPr>
-          <p:nvPr>
-            <p:ph idx="1"/>
-          </p:nvPr>
-        </p:nvSpPr>
-        <p:spPr/>
-        <p:txBody>
-          <a:bodyPr/>
-          <a:lstStyle/>
-          <a:p>
-            <a:r>
-              <a:rPr lang="en-CL" dirty="0"/>
-              <a:t>Nivel de precios: Deflactor del PIB o IPC</a:t>
-            </a:r>
-          </a:p>
-          <a:p>
-            <a:r>
-              <a:rPr lang="en-CL" dirty="0"/>
-              <a:t>Tasa de interés: Tasa de interés del bono de tres meses del gobierno central</a:t>
-            </a:r>
-          </a:p>
-          <a:p>
-            <a:r>
-              <a:rPr lang="en-CL" dirty="0"/>
-              <a:t>Salarios: Masa salarial estimada por el Banco Central (o autoridad respectiva)</a:t>
-            </a:r>
-          </a:p>
-          <a:p>
-            <a:endParaRPr lang="en-CL" dirty="0"/>
-          </a:p>
-        </p:txBody>
-      </p:sp>
-    </p:spTree>
-    <p:extLst>
-      <p:ext uri="{BB962C8B-B14F-4D97-AF65-F5344CB8AC3E}">
-        <p14:creationId xmlns:p14="http://schemas.microsoft.com/office/powerpoint/2010/main" val="3628893059"/>
-      </p:ext>
-    </p:extLst>
-  </p:cSld>
-  <p:clrMapOvr>
-    <a:masterClrMapping/>
-  </p:clrMapOvr>
-</p:sld>
-</file>
-
 <file path=ppt/slides/slide9.xml><?xml version="1.0" encoding="utf-8"?>
 <p:sld xmlns:a="http://schemas.openxmlformats.org/drawingml/2006/main" xmlns:r="http://schemas.openxmlformats.org/officeDocument/2006/relationships" xmlns:p="http://schemas.openxmlformats.org/presentationml/2006/main">
   <p:cSld>
@@ -12120,7 +12798,7 @@
           <p:cNvPr id="2" name="Title 1">
             <a:extLst>
               <a:ext uri="{FF2B5EF4-FFF2-40B4-BE49-F238E27FC236}">
-                <a16:creationId xmlns:a16="http://schemas.microsoft.com/office/drawing/2014/main" id="{318FBD01-9166-3E15-5310-9A14190C49A7}"/>
+                <a16:creationId xmlns:a16="http://schemas.microsoft.com/office/drawing/2014/main" id="{6FF43062-C0D7-FFEA-1ECA-F48B897E1C79}"/>
               </a:ext>
             </a:extLst>
           </p:cNvPr>
@@ -12138,82 +12816,58 @@
           <a:p>
             <a:r>
               <a:rPr lang="en-CL" dirty="0"/>
-              <a:t>Para EEUU (1948t1 – 2010t3)</a:t>
+              <a:t>Otras variables</a:t>
             </a:r>
           </a:p>
         </p:txBody>
       </p:sp>
-      <p:pic>
-        <p:nvPicPr>
-          <p:cNvPr id="4" name="Content Placeholder 3">
-            <a:extLst>
-              <a:ext uri="{FF2B5EF4-FFF2-40B4-BE49-F238E27FC236}">
-                <a16:creationId xmlns:a16="http://schemas.microsoft.com/office/drawing/2014/main" id="{09714680-73F9-E451-80B3-C0B04F0913B6}"/>
-              </a:ext>
-            </a:extLst>
-          </p:cNvPr>
-          <p:cNvPicPr>
-            <a:picLocks noGrp="1" noChangeAspect="1"/>
-          </p:cNvPicPr>
+      <p:sp>
+        <p:nvSpPr>
+          <p:cNvPr id="3" name="Content Placeholder 2">
+            <a:extLst>
+              <a:ext uri="{FF2B5EF4-FFF2-40B4-BE49-F238E27FC236}">
+                <a16:creationId xmlns:a16="http://schemas.microsoft.com/office/drawing/2014/main" id="{E3C2561A-0818-AAA3-A909-A96D84C51F2C}"/>
+              </a:ext>
+            </a:extLst>
+          </p:cNvPr>
+          <p:cNvSpPr>
+            <a:spLocks noGrp="1"/>
+          </p:cNvSpPr>
           <p:nvPr>
             <p:ph idx="1"/>
           </p:nvPr>
-        </p:nvPicPr>
-        <p:blipFill>
-          <a:blip r:embed="rId2"/>
-          <a:stretch>
-            <a:fillRect/>
-          </a:stretch>
-        </p:blipFill>
-        <p:spPr>
-          <a:xfrm>
-            <a:off x="838200" y="1955355"/>
-            <a:ext cx="10515600" cy="3722546"/>
-          </a:xfrm>
-          <a:prstGeom prst="rect">
-            <a:avLst/>
-          </a:prstGeom>
-        </p:spPr>
-      </p:pic>
-      <p:sp>
-        <p:nvSpPr>
-          <p:cNvPr id="5" name="TextBox 4">
-            <a:extLst>
-              <a:ext uri="{FF2B5EF4-FFF2-40B4-BE49-F238E27FC236}">
-                <a16:creationId xmlns:a16="http://schemas.microsoft.com/office/drawing/2014/main" id="{B833A778-6A4B-04B5-E5B7-E4F564AC203C}"/>
-              </a:ext>
-            </a:extLst>
-          </p:cNvPr>
-          <p:cNvSpPr txBox="1"/>
-          <p:nvPr/>
         </p:nvSpPr>
-        <p:spPr>
-          <a:xfrm>
-            <a:off x="1025611" y="5942568"/>
-            <a:ext cx="1394228" cy="369332"/>
-          </a:xfrm>
-          <a:prstGeom prst="rect">
-            <a:avLst/>
-          </a:prstGeom>
-          <a:noFill/>
-        </p:spPr>
+        <p:spPr/>
         <p:txBody>
-          <a:bodyPr wrap="none" rtlCol="0">
-            <a:spAutoFit/>
-          </a:bodyPr>
+          <a:bodyPr/>
           <a:lstStyle/>
           <a:p>
             <a:r>
               <a:rPr lang="en-CL" dirty="0"/>
-              <a:t>Fuente: BEA</a:t>
-            </a:r>
+              <a:t>Nivel de precios: Deflactor del PIB o IPC</a:t>
+            </a:r>
+          </a:p>
+          <a:p>
+            <a:r>
+              <a:rPr lang="en-CL" dirty="0"/>
+              <a:t>Tasa de interés: Tasa de interés del bono de tres meses del gobierno central</a:t>
+            </a:r>
+          </a:p>
+          <a:p>
+            <a:r>
+              <a:rPr lang="en-CL" dirty="0"/>
+              <a:t>Salarios: Masa salarial estimada por el Banco Central (o autoridad respectiva)</a:t>
+            </a:r>
+          </a:p>
+          <a:p>
+            <a:endParaRPr lang="en-CL" dirty="0"/>
           </a:p>
         </p:txBody>
       </p:sp>
     </p:spTree>
     <p:extLst>
       <p:ext uri="{BB962C8B-B14F-4D97-AF65-F5344CB8AC3E}">
-        <p14:creationId xmlns:p14="http://schemas.microsoft.com/office/powerpoint/2010/main" val="3204697612"/>
+        <p14:creationId xmlns:p14="http://schemas.microsoft.com/office/powerpoint/2010/main" val="3628893059"/>
       </p:ext>
     </p:extLst>
   </p:cSld>

</xml_diff>